<commit_message>
updated powerpoint, sorry for the delay!
</commit_message>
<xml_diff>
--- a/p4_slides.pptx
+++ b/p4_slides.pptx
@@ -5,13 +5,37 @@
     <p:sldMasterId id="2147483689" r:id="rId1"/>
   </p:sldMasterIdLst>
   <p:notesMasterIdLst>
-    <p:notesMasterId r:id="rId6"/>
+    <p:notesMasterId r:id="rId30"/>
   </p:notesMasterIdLst>
   <p:sldIdLst>
     <p:sldId id="256" r:id="rId2"/>
     <p:sldId id="257" r:id="rId3"/>
     <p:sldId id="258" r:id="rId4"/>
     <p:sldId id="259" r:id="rId5"/>
+    <p:sldId id="260" r:id="rId6"/>
+    <p:sldId id="262" r:id="rId7"/>
+    <p:sldId id="261" r:id="rId8"/>
+    <p:sldId id="264" r:id="rId9"/>
+    <p:sldId id="269" r:id="rId10"/>
+    <p:sldId id="263" r:id="rId11"/>
+    <p:sldId id="265" r:id="rId12"/>
+    <p:sldId id="266" r:id="rId13"/>
+    <p:sldId id="271" r:id="rId14"/>
+    <p:sldId id="270" r:id="rId15"/>
+    <p:sldId id="272" r:id="rId16"/>
+    <p:sldId id="273" r:id="rId17"/>
+    <p:sldId id="274" r:id="rId18"/>
+    <p:sldId id="278" r:id="rId19"/>
+    <p:sldId id="279" r:id="rId20"/>
+    <p:sldId id="275" r:id="rId21"/>
+    <p:sldId id="276" r:id="rId22"/>
+    <p:sldId id="277" r:id="rId23"/>
+    <p:sldId id="267" r:id="rId24"/>
+    <p:sldId id="268" r:id="rId25"/>
+    <p:sldId id="280" r:id="rId26"/>
+    <p:sldId id="283" r:id="rId27"/>
+    <p:sldId id="281" r:id="rId28"/>
+    <p:sldId id="282" r:id="rId29"/>
   </p:sldIdLst>
   <p:sldSz cx="12192000" cy="6858000"/>
   <p:notesSz cx="6858000" cy="9144000"/>
@@ -119,12 +143,39 @@
             <p14:sldId id="257"/>
             <p14:sldId id="258"/>
             <p14:sldId id="259"/>
+            <p14:sldId id="260"/>
+            <p14:sldId id="262"/>
+            <p14:sldId id="261"/>
+            <p14:sldId id="264"/>
+            <p14:sldId id="269"/>
+            <p14:sldId id="263"/>
+            <p14:sldId id="265"/>
+            <p14:sldId id="266"/>
+            <p14:sldId id="271"/>
+            <p14:sldId id="270"/>
+            <p14:sldId id="272"/>
+            <p14:sldId id="273"/>
+            <p14:sldId id="274"/>
+            <p14:sldId id="278"/>
+            <p14:sldId id="279"/>
+            <p14:sldId id="275"/>
+            <p14:sldId id="276"/>
+            <p14:sldId id="277"/>
+            <p14:sldId id="267"/>
+            <p14:sldId id="268"/>
+            <p14:sldId id="280"/>
+            <p14:sldId id="283"/>
+            <p14:sldId id="281"/>
+            <p14:sldId id="282"/>
           </p14:sldIdLst>
         </p14:section>
       </p14:sectionLst>
     </p:ext>
     <p:ext uri="{EFAFB233-063F-42B5-8137-9DF3F51BA10A}">
       <p15:sldGuideLst xmlns:p15="http://schemas.microsoft.com/office/powerpoint/2012/main"/>
+    </p:ext>
+    <p:ext uri="{2D200454-40CA-4A62-9FC3-DE9A4176ACB9}">
+      <p15:notesGuideLst xmlns:p15="http://schemas.microsoft.com/office/powerpoint/2012/main"/>
     </p:ext>
   </p:extLst>
 </p:presentation>
@@ -212,7 +263,7 @@
           <a:p>
             <a:fld id="{DAA3DB30-34A2-49FC-A104-5ED25AA7FEB3}" type="datetimeFigureOut">
               <a:rPr lang="en-US" smtClean="0"/>
-              <a:t>2023-12-05</a:t>
+              <a:t>2023-12-09</a:t>
             </a:fld>
             <a:endParaRPr lang="en-US"/>
           </a:p>
@@ -998,7 +1049,7 @@
             <a:fld id="{B61BEF0D-F0BB-DE4B-95CE-6DB70DBA9567}" type="datetimeFigureOut">
               <a:rPr lang="en-US" smtClean="0"/>
               <a:pPr/>
-              <a:t>2023-12-05</a:t>
+              <a:t>2023-12-09</a:t>
             </a:fld>
             <a:endParaRPr lang="en-US" dirty="0"/>
           </a:p>
@@ -1262,7 +1313,7 @@
             <a:fld id="{B61BEF0D-F0BB-DE4B-95CE-6DB70DBA9567}" type="datetimeFigureOut">
               <a:rPr lang="en-US" smtClean="0"/>
               <a:pPr/>
-              <a:t>2023-12-05</a:t>
+              <a:t>2023-12-09</a:t>
             </a:fld>
             <a:endParaRPr lang="en-US" dirty="0"/>
           </a:p>
@@ -1499,7 +1550,7 @@
             <a:fld id="{B61BEF0D-F0BB-DE4B-95CE-6DB70DBA9567}" type="datetimeFigureOut">
               <a:rPr lang="en-US" smtClean="0"/>
               <a:pPr/>
-              <a:t>2023-12-05</a:t>
+              <a:t>2023-12-09</a:t>
             </a:fld>
             <a:endParaRPr lang="en-US" dirty="0"/>
           </a:p>
@@ -1741,7 +1792,7 @@
             <a:fld id="{B61BEF0D-F0BB-DE4B-95CE-6DB70DBA9567}" type="datetimeFigureOut">
               <a:rPr lang="en-US" smtClean="0"/>
               <a:pPr/>
-              <a:t>2023-12-05</a:t>
+              <a:t>2023-12-09</a:t>
             </a:fld>
             <a:endParaRPr lang="en-US" dirty="0"/>
           </a:p>
@@ -2050,7 +2101,7 @@
             <a:fld id="{B61BEF0D-F0BB-DE4B-95CE-6DB70DBA9567}" type="datetimeFigureOut">
               <a:rPr lang="en-US" smtClean="0"/>
               <a:pPr/>
-              <a:t>2023-12-05</a:t>
+              <a:t>2023-12-09</a:t>
             </a:fld>
             <a:endParaRPr lang="en-US" dirty="0"/>
           </a:p>
@@ -2354,7 +2405,7 @@
             <a:fld id="{B61BEF0D-F0BB-DE4B-95CE-6DB70DBA9567}" type="datetimeFigureOut">
               <a:rPr lang="en-US" smtClean="0"/>
               <a:pPr/>
-              <a:t>2023-12-05</a:t>
+              <a:t>2023-12-09</a:t>
             </a:fld>
             <a:endParaRPr lang="en-US" dirty="0"/>
           </a:p>
@@ -2778,7 +2829,7 @@
             <a:fld id="{B61BEF0D-F0BB-DE4B-95CE-6DB70DBA9567}" type="datetimeFigureOut">
               <a:rPr lang="en-US" smtClean="0"/>
               <a:pPr/>
-              <a:t>2023-12-05</a:t>
+              <a:t>2023-12-09</a:t>
             </a:fld>
             <a:endParaRPr lang="en-US" dirty="0"/>
           </a:p>
@@ -2942,7 +2993,7 @@
             <a:fld id="{B61BEF0D-F0BB-DE4B-95CE-6DB70DBA9567}" type="datetimeFigureOut">
               <a:rPr lang="en-US" smtClean="0"/>
               <a:pPr/>
-              <a:t>2023-12-05</a:t>
+              <a:t>2023-12-09</a:t>
             </a:fld>
             <a:endParaRPr lang="en-US" dirty="0"/>
           </a:p>
@@ -3039,7 +3090,7 @@
             <a:fld id="{B61BEF0D-F0BB-DE4B-95CE-6DB70DBA9567}" type="datetimeFigureOut">
               <a:rPr lang="en-US" smtClean="0"/>
               <a:pPr/>
-              <a:t>2023-12-05</a:t>
+              <a:t>2023-12-09</a:t>
             </a:fld>
             <a:endParaRPr lang="en-US" dirty="0"/>
           </a:p>
@@ -3419,7 +3470,7 @@
             <a:fld id="{B61BEF0D-F0BB-DE4B-95CE-6DB70DBA9567}" type="datetimeFigureOut">
               <a:rPr lang="en-US" smtClean="0"/>
               <a:pPr/>
-              <a:t>2023-12-05</a:t>
+              <a:t>2023-12-09</a:t>
             </a:fld>
             <a:endParaRPr lang="en-US" dirty="0"/>
           </a:p>
@@ -3710,7 +3761,7 @@
             <a:fld id="{B61BEF0D-F0BB-DE4B-95CE-6DB70DBA9567}" type="datetimeFigureOut">
               <a:rPr lang="en-US" smtClean="0"/>
               <a:pPr/>
-              <a:t>2023-12-05</a:t>
+              <a:t>2023-12-09</a:t>
             </a:fld>
             <a:endParaRPr lang="en-US" dirty="0"/>
           </a:p>
@@ -3923,7 +3974,7 @@
             <a:fld id="{B61BEF0D-F0BB-DE4B-95CE-6DB70DBA9567}" type="datetimeFigureOut">
               <a:rPr lang="en-US" smtClean="0"/>
               <a:pPr/>
-              <a:t>2023-12-05</a:t>
+              <a:t>2023-12-09</a:t>
             </a:fld>
             <a:endParaRPr lang="en-US" dirty="0"/>
           </a:p>
@@ -4648,6 +4699,1371 @@
 </p:sld>
 </file>
 
+<file path=ppt/slides/slide10.xml><?xml version="1.0" encoding="utf-8"?>
+<p:sld xmlns:a="http://schemas.openxmlformats.org/drawingml/2006/main" xmlns:r="http://schemas.openxmlformats.org/officeDocument/2006/relationships" xmlns:p="http://schemas.openxmlformats.org/presentationml/2006/main">
+  <p:cSld>
+    <p:spTree>
+      <p:nvGrpSpPr>
+        <p:cNvPr id="1" name=""/>
+        <p:cNvGrpSpPr/>
+        <p:nvPr/>
+      </p:nvGrpSpPr>
+      <p:grpSpPr>
+        <a:xfrm>
+          <a:off x="0" y="0"/>
+          <a:ext cx="0" cy="0"/>
+          <a:chOff x="0" y="0"/>
+          <a:chExt cx="0" cy="0"/>
+        </a:xfrm>
+      </p:grpSpPr>
+      <p:sp>
+        <p:nvSpPr>
+          <p:cNvPr id="2" name="Title 1">
+            <a:extLst>
+              <a:ext uri="{FF2B5EF4-FFF2-40B4-BE49-F238E27FC236}">
+                <a16:creationId xmlns:a16="http://schemas.microsoft.com/office/drawing/2014/main" id="{A1AAE40B-FFD2-11F4-B7DF-1FD576DD4AF7}"/>
+              </a:ext>
+            </a:extLst>
+          </p:cNvPr>
+          <p:cNvSpPr>
+            <a:spLocks noGrp="1"/>
+          </p:cNvSpPr>
+          <p:nvPr>
+            <p:ph type="title"/>
+          </p:nvPr>
+        </p:nvSpPr>
+        <p:spPr/>
+        <p:txBody>
+          <a:bodyPr/>
+          <a:lstStyle/>
+          <a:p>
+            <a:r>
+              <a:rPr lang="en-US" dirty="0"/>
+              <a:t>Feature </a:t>
+            </a:r>
+            <a:r>
+              <a:rPr lang="en-US" dirty="0" err="1"/>
+              <a:t>imporantances</a:t>
+            </a:r>
+            <a:endParaRPr lang="en-US" dirty="0"/>
+          </a:p>
+        </p:txBody>
+      </p:sp>
+      <p:pic>
+        <p:nvPicPr>
+          <p:cNvPr id="4" name="Picture 3" descr="A graph with blue bars&#10;&#10;Description automatically generated">
+            <a:extLst>
+              <a:ext uri="{FF2B5EF4-FFF2-40B4-BE49-F238E27FC236}">
+                <a16:creationId xmlns:a16="http://schemas.microsoft.com/office/drawing/2014/main" id="{4887B13A-CA8E-41B0-4B84-995DC2FE9588}"/>
+              </a:ext>
+            </a:extLst>
+          </p:cNvPr>
+          <p:cNvPicPr>
+            <a:picLocks noChangeAspect="1"/>
+          </p:cNvPicPr>
+          <p:nvPr/>
+        </p:nvPicPr>
+        <p:blipFill>
+          <a:blip r:embed="rId2"/>
+          <a:stretch>
+            <a:fillRect/>
+          </a:stretch>
+        </p:blipFill>
+        <p:spPr>
+          <a:xfrm>
+            <a:off x="6415653" y="2306741"/>
+            <a:ext cx="5242409" cy="4197658"/>
+          </a:xfrm>
+          <a:prstGeom prst="rect">
+            <a:avLst/>
+          </a:prstGeom>
+        </p:spPr>
+      </p:pic>
+      <p:pic>
+        <p:nvPicPr>
+          <p:cNvPr id="6" name="Picture 5" descr="A computer screen with text&#10;&#10;Description automatically generated">
+            <a:extLst>
+              <a:ext uri="{FF2B5EF4-FFF2-40B4-BE49-F238E27FC236}">
+                <a16:creationId xmlns:a16="http://schemas.microsoft.com/office/drawing/2014/main" id="{EC79DA04-4B4F-EA99-055E-CDB6D4C3D7CD}"/>
+              </a:ext>
+            </a:extLst>
+          </p:cNvPr>
+          <p:cNvPicPr>
+            <a:picLocks noChangeAspect="1"/>
+          </p:cNvPicPr>
+          <p:nvPr/>
+        </p:nvPicPr>
+        <p:blipFill>
+          <a:blip r:embed="rId3"/>
+          <a:stretch>
+            <a:fillRect/>
+          </a:stretch>
+        </p:blipFill>
+        <p:spPr>
+          <a:xfrm>
+            <a:off x="502309" y="3140657"/>
+            <a:ext cx="5913344" cy="1901031"/>
+          </a:xfrm>
+          <a:prstGeom prst="rect">
+            <a:avLst/>
+          </a:prstGeom>
+        </p:spPr>
+      </p:pic>
+    </p:spTree>
+    <p:extLst>
+      <p:ext uri="{BB962C8B-B14F-4D97-AF65-F5344CB8AC3E}">
+        <p14:creationId xmlns:p14="http://schemas.microsoft.com/office/powerpoint/2010/main" val="4164059147"/>
+      </p:ext>
+    </p:extLst>
+  </p:cSld>
+  <p:clrMapOvr>
+    <a:masterClrMapping/>
+  </p:clrMapOvr>
+</p:sld>
+</file>
+
+<file path=ppt/slides/slide11.xml><?xml version="1.0" encoding="utf-8"?>
+<p:sld xmlns:a="http://schemas.openxmlformats.org/drawingml/2006/main" xmlns:r="http://schemas.openxmlformats.org/officeDocument/2006/relationships" xmlns:p="http://schemas.openxmlformats.org/presentationml/2006/main">
+  <p:cSld>
+    <p:spTree>
+      <p:nvGrpSpPr>
+        <p:cNvPr id="1" name=""/>
+        <p:cNvGrpSpPr/>
+        <p:nvPr/>
+      </p:nvGrpSpPr>
+      <p:grpSpPr>
+        <a:xfrm>
+          <a:off x="0" y="0"/>
+          <a:ext cx="0" cy="0"/>
+          <a:chOff x="0" y="0"/>
+          <a:chExt cx="0" cy="0"/>
+        </a:xfrm>
+      </p:grpSpPr>
+      <p:sp>
+        <p:nvSpPr>
+          <p:cNvPr id="2" name="Title 1">
+            <a:extLst>
+              <a:ext uri="{FF2B5EF4-FFF2-40B4-BE49-F238E27FC236}">
+                <a16:creationId xmlns:a16="http://schemas.microsoft.com/office/drawing/2014/main" id="{A1AAE40B-FFD2-11F4-B7DF-1FD576DD4AF7}"/>
+              </a:ext>
+            </a:extLst>
+          </p:cNvPr>
+          <p:cNvSpPr>
+            <a:spLocks noGrp="1"/>
+          </p:cNvSpPr>
+          <p:nvPr>
+            <p:ph type="title"/>
+          </p:nvPr>
+        </p:nvSpPr>
+        <p:spPr/>
+        <p:txBody>
+          <a:bodyPr/>
+          <a:lstStyle/>
+          <a:p>
+            <a:r>
+              <a:rPr lang="en-US" dirty="0"/>
+              <a:t>Cross validation</a:t>
+            </a:r>
+          </a:p>
+        </p:txBody>
+      </p:sp>
+      <p:pic>
+        <p:nvPicPr>
+          <p:cNvPr id="4" name="Picture 3" descr="A screen shot of a computer program&#10;&#10;Description automatically generated">
+            <a:extLst>
+              <a:ext uri="{FF2B5EF4-FFF2-40B4-BE49-F238E27FC236}">
+                <a16:creationId xmlns:a16="http://schemas.microsoft.com/office/drawing/2014/main" id="{CDBBC7CF-F7D4-01FB-41C0-526E566F814B}"/>
+              </a:ext>
+            </a:extLst>
+          </p:cNvPr>
+          <p:cNvPicPr>
+            <a:picLocks noChangeAspect="1"/>
+          </p:cNvPicPr>
+          <p:nvPr/>
+        </p:nvPicPr>
+        <p:blipFill>
+          <a:blip r:embed="rId2"/>
+          <a:stretch>
+            <a:fillRect/>
+          </a:stretch>
+        </p:blipFill>
+        <p:spPr>
+          <a:xfrm>
+            <a:off x="596672" y="1988222"/>
+            <a:ext cx="6095238" cy="2038095"/>
+          </a:xfrm>
+          <a:prstGeom prst="rect">
+            <a:avLst/>
+          </a:prstGeom>
+        </p:spPr>
+      </p:pic>
+      <p:pic>
+        <p:nvPicPr>
+          <p:cNvPr id="6" name="Picture 5" descr="A computer screen shot of a program&#10;&#10;Description automatically generated">
+            <a:extLst>
+              <a:ext uri="{FF2B5EF4-FFF2-40B4-BE49-F238E27FC236}">
+                <a16:creationId xmlns:a16="http://schemas.microsoft.com/office/drawing/2014/main" id="{5185F6FD-08BE-41CF-E232-50EF5AD32B85}"/>
+              </a:ext>
+            </a:extLst>
+          </p:cNvPr>
+          <p:cNvPicPr>
+            <a:picLocks noChangeAspect="1"/>
+          </p:cNvPicPr>
+          <p:nvPr/>
+        </p:nvPicPr>
+        <p:blipFill>
+          <a:blip r:embed="rId3"/>
+          <a:stretch>
+            <a:fillRect/>
+          </a:stretch>
+        </p:blipFill>
+        <p:spPr>
+          <a:xfrm>
+            <a:off x="3319796" y="4124640"/>
+            <a:ext cx="8285714" cy="2580952"/>
+          </a:xfrm>
+          <a:prstGeom prst="rect">
+            <a:avLst/>
+          </a:prstGeom>
+        </p:spPr>
+      </p:pic>
+    </p:spTree>
+    <p:extLst>
+      <p:ext uri="{BB962C8B-B14F-4D97-AF65-F5344CB8AC3E}">
+        <p14:creationId xmlns:p14="http://schemas.microsoft.com/office/powerpoint/2010/main" val="3931553142"/>
+      </p:ext>
+    </p:extLst>
+  </p:cSld>
+  <p:clrMapOvr>
+    <a:masterClrMapping/>
+  </p:clrMapOvr>
+</p:sld>
+</file>
+
+<file path=ppt/slides/slide12.xml><?xml version="1.0" encoding="utf-8"?>
+<p:sld xmlns:a="http://schemas.openxmlformats.org/drawingml/2006/main" xmlns:r="http://schemas.openxmlformats.org/officeDocument/2006/relationships" xmlns:p="http://schemas.openxmlformats.org/presentationml/2006/main">
+  <p:cSld>
+    <p:spTree>
+      <p:nvGrpSpPr>
+        <p:cNvPr id="1" name=""/>
+        <p:cNvGrpSpPr/>
+        <p:nvPr/>
+      </p:nvGrpSpPr>
+      <p:grpSpPr>
+        <a:xfrm>
+          <a:off x="0" y="0"/>
+          <a:ext cx="0" cy="0"/>
+          <a:chOff x="0" y="0"/>
+          <a:chExt cx="0" cy="0"/>
+        </a:xfrm>
+      </p:grpSpPr>
+      <p:sp>
+        <p:nvSpPr>
+          <p:cNvPr id="2" name="Title 1">
+            <a:extLst>
+              <a:ext uri="{FF2B5EF4-FFF2-40B4-BE49-F238E27FC236}">
+                <a16:creationId xmlns:a16="http://schemas.microsoft.com/office/drawing/2014/main" id="{A1AAE40B-FFD2-11F4-B7DF-1FD576DD4AF7}"/>
+              </a:ext>
+            </a:extLst>
+          </p:cNvPr>
+          <p:cNvSpPr>
+            <a:spLocks noGrp="1"/>
+          </p:cNvSpPr>
+          <p:nvPr>
+            <p:ph type="title"/>
+          </p:nvPr>
+        </p:nvSpPr>
+        <p:spPr/>
+        <p:txBody>
+          <a:bodyPr/>
+          <a:lstStyle/>
+          <a:p>
+            <a:r>
+              <a:rPr lang="en-US" dirty="0"/>
+              <a:t>Evaluating the model using trained data</a:t>
+            </a:r>
+          </a:p>
+        </p:txBody>
+      </p:sp>
+      <p:pic>
+        <p:nvPicPr>
+          <p:cNvPr id="4" name="Picture 3" descr="A computer screen shot of a program&#10;&#10;Description automatically generated">
+            <a:extLst>
+              <a:ext uri="{FF2B5EF4-FFF2-40B4-BE49-F238E27FC236}">
+                <a16:creationId xmlns:a16="http://schemas.microsoft.com/office/drawing/2014/main" id="{8EE2BAF1-CEC4-2A68-9594-F6D6FD028786}"/>
+              </a:ext>
+            </a:extLst>
+          </p:cNvPr>
+          <p:cNvPicPr>
+            <a:picLocks noChangeAspect="1"/>
+          </p:cNvPicPr>
+          <p:nvPr/>
+        </p:nvPicPr>
+        <p:blipFill>
+          <a:blip r:embed="rId2"/>
+          <a:stretch>
+            <a:fillRect/>
+          </a:stretch>
+        </p:blipFill>
+        <p:spPr>
+          <a:xfrm>
+            <a:off x="3281555" y="2673920"/>
+            <a:ext cx="5618294" cy="3156610"/>
+          </a:xfrm>
+          <a:prstGeom prst="rect">
+            <a:avLst/>
+          </a:prstGeom>
+        </p:spPr>
+      </p:pic>
+    </p:spTree>
+    <p:extLst>
+      <p:ext uri="{BB962C8B-B14F-4D97-AF65-F5344CB8AC3E}">
+        <p14:creationId xmlns:p14="http://schemas.microsoft.com/office/powerpoint/2010/main" val="1589595778"/>
+      </p:ext>
+    </p:extLst>
+  </p:cSld>
+  <p:clrMapOvr>
+    <a:masterClrMapping/>
+  </p:clrMapOvr>
+</p:sld>
+</file>
+
+<file path=ppt/slides/slide13.xml><?xml version="1.0" encoding="utf-8"?>
+<p:sld xmlns:a="http://schemas.openxmlformats.org/drawingml/2006/main" xmlns:r="http://schemas.openxmlformats.org/officeDocument/2006/relationships" xmlns:p="http://schemas.openxmlformats.org/presentationml/2006/main">
+  <p:cSld>
+    <p:spTree>
+      <p:nvGrpSpPr>
+        <p:cNvPr id="1" name=""/>
+        <p:cNvGrpSpPr/>
+        <p:nvPr/>
+      </p:nvGrpSpPr>
+      <p:grpSpPr>
+        <a:xfrm>
+          <a:off x="0" y="0"/>
+          <a:ext cx="0" cy="0"/>
+          <a:chOff x="0" y="0"/>
+          <a:chExt cx="0" cy="0"/>
+        </a:xfrm>
+      </p:grpSpPr>
+      <p:sp>
+        <p:nvSpPr>
+          <p:cNvPr id="2" name="Title 1">
+            <a:extLst>
+              <a:ext uri="{FF2B5EF4-FFF2-40B4-BE49-F238E27FC236}">
+                <a16:creationId xmlns:a16="http://schemas.microsoft.com/office/drawing/2014/main" id="{A1AAE40B-FFD2-11F4-B7DF-1FD576DD4AF7}"/>
+              </a:ext>
+            </a:extLst>
+          </p:cNvPr>
+          <p:cNvSpPr>
+            <a:spLocks noGrp="1"/>
+          </p:cNvSpPr>
+          <p:nvPr>
+            <p:ph type="title"/>
+          </p:nvPr>
+        </p:nvSpPr>
+        <p:spPr/>
+        <p:txBody>
+          <a:bodyPr/>
+          <a:lstStyle/>
+          <a:p>
+            <a:r>
+              <a:rPr lang="en-US" dirty="0"/>
+              <a:t>Linear regression</a:t>
+            </a:r>
+          </a:p>
+        </p:txBody>
+      </p:sp>
+      <p:pic>
+        <p:nvPicPr>
+          <p:cNvPr id="4" name="Picture 3" descr="A computer screen with text and numbers&#10;&#10;Description automatically generated">
+            <a:extLst>
+              <a:ext uri="{FF2B5EF4-FFF2-40B4-BE49-F238E27FC236}">
+                <a16:creationId xmlns:a16="http://schemas.microsoft.com/office/drawing/2014/main" id="{F6FE71A8-0088-52BC-D412-8536FA632BA7}"/>
+              </a:ext>
+            </a:extLst>
+          </p:cNvPr>
+          <p:cNvPicPr>
+            <a:picLocks noChangeAspect="1"/>
+          </p:cNvPicPr>
+          <p:nvPr/>
+        </p:nvPicPr>
+        <p:blipFill>
+          <a:blip r:embed="rId2"/>
+          <a:stretch>
+            <a:fillRect/>
+          </a:stretch>
+        </p:blipFill>
+        <p:spPr>
+          <a:xfrm>
+            <a:off x="719506" y="3195009"/>
+            <a:ext cx="5247619" cy="2933333"/>
+          </a:xfrm>
+          <a:prstGeom prst="rect">
+            <a:avLst/>
+          </a:prstGeom>
+        </p:spPr>
+      </p:pic>
+      <p:pic>
+        <p:nvPicPr>
+          <p:cNvPr id="6" name="Picture 5" descr="A screen shot of a computer code&#10;&#10;Description automatically generated">
+            <a:extLst>
+              <a:ext uri="{FF2B5EF4-FFF2-40B4-BE49-F238E27FC236}">
+                <a16:creationId xmlns:a16="http://schemas.microsoft.com/office/drawing/2014/main" id="{B160D53E-5077-422C-21D3-DA4C2B066203}"/>
+              </a:ext>
+            </a:extLst>
+          </p:cNvPr>
+          <p:cNvPicPr>
+            <a:picLocks noChangeAspect="1"/>
+          </p:cNvPicPr>
+          <p:nvPr/>
+        </p:nvPicPr>
+        <p:blipFill>
+          <a:blip r:embed="rId3"/>
+          <a:stretch>
+            <a:fillRect/>
+          </a:stretch>
+        </p:blipFill>
+        <p:spPr>
+          <a:xfrm>
+            <a:off x="5596304" y="2281344"/>
+            <a:ext cx="5876190" cy="1685714"/>
+          </a:xfrm>
+          <a:prstGeom prst="rect">
+            <a:avLst/>
+          </a:prstGeom>
+        </p:spPr>
+      </p:pic>
+    </p:spTree>
+    <p:extLst>
+      <p:ext uri="{BB962C8B-B14F-4D97-AF65-F5344CB8AC3E}">
+        <p14:creationId xmlns:p14="http://schemas.microsoft.com/office/powerpoint/2010/main" val="1847607645"/>
+      </p:ext>
+    </p:extLst>
+  </p:cSld>
+  <p:clrMapOvr>
+    <a:masterClrMapping/>
+  </p:clrMapOvr>
+</p:sld>
+</file>
+
+<file path=ppt/slides/slide14.xml><?xml version="1.0" encoding="utf-8"?>
+<p:sld xmlns:a="http://schemas.openxmlformats.org/drawingml/2006/main" xmlns:r="http://schemas.openxmlformats.org/officeDocument/2006/relationships" xmlns:p="http://schemas.openxmlformats.org/presentationml/2006/main">
+  <p:cSld>
+    <p:spTree>
+      <p:nvGrpSpPr>
+        <p:cNvPr id="1" name=""/>
+        <p:cNvGrpSpPr/>
+        <p:nvPr/>
+      </p:nvGrpSpPr>
+      <p:grpSpPr>
+        <a:xfrm>
+          <a:off x="0" y="0"/>
+          <a:ext cx="0" cy="0"/>
+          <a:chOff x="0" y="0"/>
+          <a:chExt cx="0" cy="0"/>
+        </a:xfrm>
+      </p:grpSpPr>
+      <p:sp>
+        <p:nvSpPr>
+          <p:cNvPr id="2" name="Title 1">
+            <a:extLst>
+              <a:ext uri="{FF2B5EF4-FFF2-40B4-BE49-F238E27FC236}">
+                <a16:creationId xmlns:a16="http://schemas.microsoft.com/office/drawing/2014/main" id="{A1AAE40B-FFD2-11F4-B7DF-1FD576DD4AF7}"/>
+              </a:ext>
+            </a:extLst>
+          </p:cNvPr>
+          <p:cNvSpPr>
+            <a:spLocks noGrp="1"/>
+          </p:cNvSpPr>
+          <p:nvPr>
+            <p:ph type="title"/>
+          </p:nvPr>
+        </p:nvSpPr>
+        <p:spPr/>
+        <p:txBody>
+          <a:bodyPr/>
+          <a:lstStyle/>
+          <a:p>
+            <a:r>
+              <a:rPr lang="en-US" dirty="0"/>
+              <a:t>Linear regression charts</a:t>
+            </a:r>
+          </a:p>
+        </p:txBody>
+      </p:sp>
+      <p:pic>
+        <p:nvPicPr>
+          <p:cNvPr id="4" name="Picture 3" descr="A graph of a person with blue dots&#10;&#10;Description automatically generated">
+            <a:extLst>
+              <a:ext uri="{FF2B5EF4-FFF2-40B4-BE49-F238E27FC236}">
+                <a16:creationId xmlns:a16="http://schemas.microsoft.com/office/drawing/2014/main" id="{86579B2E-0ED0-20B3-B617-E0F9083BC386}"/>
+              </a:ext>
+            </a:extLst>
+          </p:cNvPr>
+          <p:cNvPicPr>
+            <a:picLocks noChangeAspect="1"/>
+          </p:cNvPicPr>
+          <p:nvPr/>
+        </p:nvPicPr>
+        <p:blipFill>
+          <a:blip r:embed="rId2"/>
+          <a:stretch>
+            <a:fillRect/>
+          </a:stretch>
+        </p:blipFill>
+        <p:spPr>
+          <a:xfrm>
+            <a:off x="2691238" y="1914714"/>
+            <a:ext cx="6809524" cy="3028571"/>
+          </a:xfrm>
+          <a:prstGeom prst="rect">
+            <a:avLst/>
+          </a:prstGeom>
+        </p:spPr>
+      </p:pic>
+      <p:pic>
+        <p:nvPicPr>
+          <p:cNvPr id="6" name="Picture 5" descr="A screen shot of a computer program&#10;&#10;Description automatically generated">
+            <a:extLst>
+              <a:ext uri="{FF2B5EF4-FFF2-40B4-BE49-F238E27FC236}">
+                <a16:creationId xmlns:a16="http://schemas.microsoft.com/office/drawing/2014/main" id="{3D9B6DE4-B3B5-60EF-1942-FFA6179980B7}"/>
+              </a:ext>
+            </a:extLst>
+          </p:cNvPr>
+          <p:cNvPicPr>
+            <a:picLocks noChangeAspect="1"/>
+          </p:cNvPicPr>
+          <p:nvPr/>
+        </p:nvPicPr>
+        <p:blipFill>
+          <a:blip r:embed="rId3"/>
+          <a:stretch>
+            <a:fillRect/>
+          </a:stretch>
+        </p:blipFill>
+        <p:spPr>
+          <a:xfrm>
+            <a:off x="3314511" y="5061712"/>
+            <a:ext cx="5552381" cy="1552381"/>
+          </a:xfrm>
+          <a:prstGeom prst="rect">
+            <a:avLst/>
+          </a:prstGeom>
+        </p:spPr>
+      </p:pic>
+    </p:spTree>
+    <p:extLst>
+      <p:ext uri="{BB962C8B-B14F-4D97-AF65-F5344CB8AC3E}">
+        <p14:creationId xmlns:p14="http://schemas.microsoft.com/office/powerpoint/2010/main" val="1617907460"/>
+      </p:ext>
+    </p:extLst>
+  </p:cSld>
+  <p:clrMapOvr>
+    <a:masterClrMapping/>
+  </p:clrMapOvr>
+</p:sld>
+</file>
+
+<file path=ppt/slides/slide15.xml><?xml version="1.0" encoding="utf-8"?>
+<p:sld xmlns:a="http://schemas.openxmlformats.org/drawingml/2006/main" xmlns:r="http://schemas.openxmlformats.org/officeDocument/2006/relationships" xmlns:p="http://schemas.openxmlformats.org/presentationml/2006/main">
+  <p:cSld>
+    <p:spTree>
+      <p:nvGrpSpPr>
+        <p:cNvPr id="1" name=""/>
+        <p:cNvGrpSpPr/>
+        <p:nvPr/>
+      </p:nvGrpSpPr>
+      <p:grpSpPr>
+        <a:xfrm>
+          <a:off x="0" y="0"/>
+          <a:ext cx="0" cy="0"/>
+          <a:chOff x="0" y="0"/>
+          <a:chExt cx="0" cy="0"/>
+        </a:xfrm>
+      </p:grpSpPr>
+      <p:sp>
+        <p:nvSpPr>
+          <p:cNvPr id="2" name="Title 1">
+            <a:extLst>
+              <a:ext uri="{FF2B5EF4-FFF2-40B4-BE49-F238E27FC236}">
+                <a16:creationId xmlns:a16="http://schemas.microsoft.com/office/drawing/2014/main" id="{A1AAE40B-FFD2-11F4-B7DF-1FD576DD4AF7}"/>
+              </a:ext>
+            </a:extLst>
+          </p:cNvPr>
+          <p:cNvSpPr>
+            <a:spLocks noGrp="1"/>
+          </p:cNvSpPr>
+          <p:nvPr>
+            <p:ph type="title"/>
+          </p:nvPr>
+        </p:nvSpPr>
+        <p:spPr/>
+        <p:txBody>
+          <a:bodyPr/>
+          <a:lstStyle/>
+          <a:p>
+            <a:r>
+              <a:rPr lang="en-US" dirty="0"/>
+              <a:t>Actual analysis part 1</a:t>
+            </a:r>
+          </a:p>
+        </p:txBody>
+      </p:sp>
+      <p:pic>
+        <p:nvPicPr>
+          <p:cNvPr id="4" name="Picture 3" descr="A screen shot of a computer&#10;&#10;Description automatically generated">
+            <a:extLst>
+              <a:ext uri="{FF2B5EF4-FFF2-40B4-BE49-F238E27FC236}">
+                <a16:creationId xmlns:a16="http://schemas.microsoft.com/office/drawing/2014/main" id="{0E88DA7E-7406-72DA-3747-B3FCB46E7950}"/>
+              </a:ext>
+            </a:extLst>
+          </p:cNvPr>
+          <p:cNvPicPr>
+            <a:picLocks noChangeAspect="1"/>
+          </p:cNvPicPr>
+          <p:nvPr/>
+        </p:nvPicPr>
+        <p:blipFill>
+          <a:blip r:embed="rId2"/>
+          <a:stretch>
+            <a:fillRect/>
+          </a:stretch>
+        </p:blipFill>
+        <p:spPr>
+          <a:xfrm>
+            <a:off x="575894" y="1955129"/>
+            <a:ext cx="5561905" cy="2219048"/>
+          </a:xfrm>
+          <a:prstGeom prst="rect">
+            <a:avLst/>
+          </a:prstGeom>
+        </p:spPr>
+      </p:pic>
+      <p:pic>
+        <p:nvPicPr>
+          <p:cNvPr id="6" name="Picture 5" descr="A screenshot of a computer&#10;&#10;Description automatically generated">
+            <a:extLst>
+              <a:ext uri="{FF2B5EF4-FFF2-40B4-BE49-F238E27FC236}">
+                <a16:creationId xmlns:a16="http://schemas.microsoft.com/office/drawing/2014/main" id="{FC4FDBF2-9770-01D9-26C7-DDF192B4BE79}"/>
+              </a:ext>
+            </a:extLst>
+          </p:cNvPr>
+          <p:cNvPicPr>
+            <a:picLocks noChangeAspect="1"/>
+          </p:cNvPicPr>
+          <p:nvPr/>
+        </p:nvPicPr>
+        <p:blipFill>
+          <a:blip r:embed="rId3"/>
+          <a:stretch>
+            <a:fillRect/>
+          </a:stretch>
+        </p:blipFill>
+        <p:spPr>
+          <a:xfrm>
+            <a:off x="2832828" y="3737984"/>
+            <a:ext cx="1691540" cy="1346663"/>
+          </a:xfrm>
+          <a:prstGeom prst="rect">
+            <a:avLst/>
+          </a:prstGeom>
+        </p:spPr>
+      </p:pic>
+      <p:pic>
+        <p:nvPicPr>
+          <p:cNvPr id="8" name="Picture 7" descr="A black background with white text&#10;&#10;Description automatically generated">
+            <a:extLst>
+              <a:ext uri="{FF2B5EF4-FFF2-40B4-BE49-F238E27FC236}">
+                <a16:creationId xmlns:a16="http://schemas.microsoft.com/office/drawing/2014/main" id="{1C370194-E8FB-76CC-D5E9-D19DB42F8F61}"/>
+              </a:ext>
+            </a:extLst>
+          </p:cNvPr>
+          <p:cNvPicPr>
+            <a:picLocks noChangeAspect="1"/>
+          </p:cNvPicPr>
+          <p:nvPr/>
+        </p:nvPicPr>
+        <p:blipFill>
+          <a:blip r:embed="rId4"/>
+          <a:stretch>
+            <a:fillRect/>
+          </a:stretch>
+        </p:blipFill>
+        <p:spPr>
+          <a:xfrm>
+            <a:off x="644932" y="5194061"/>
+            <a:ext cx="5140432" cy="716955"/>
+          </a:xfrm>
+          <a:prstGeom prst="rect">
+            <a:avLst/>
+          </a:prstGeom>
+        </p:spPr>
+      </p:pic>
+      <p:pic>
+        <p:nvPicPr>
+          <p:cNvPr id="10" name="Picture 9" descr="A black background with white text&#10;&#10;Description automatically generated">
+            <a:extLst>
+              <a:ext uri="{FF2B5EF4-FFF2-40B4-BE49-F238E27FC236}">
+                <a16:creationId xmlns:a16="http://schemas.microsoft.com/office/drawing/2014/main" id="{C2CE9A68-90DE-4089-40A9-11035B10F902}"/>
+              </a:ext>
+            </a:extLst>
+          </p:cNvPr>
+          <p:cNvPicPr>
+            <a:picLocks noChangeAspect="1"/>
+          </p:cNvPicPr>
+          <p:nvPr/>
+        </p:nvPicPr>
+        <p:blipFill>
+          <a:blip r:embed="rId5"/>
+          <a:stretch>
+            <a:fillRect/>
+          </a:stretch>
+        </p:blipFill>
+        <p:spPr>
+          <a:xfrm>
+            <a:off x="6278069" y="4149149"/>
+            <a:ext cx="5123421" cy="889482"/>
+          </a:xfrm>
+          <a:prstGeom prst="rect">
+            <a:avLst/>
+          </a:prstGeom>
+        </p:spPr>
+      </p:pic>
+      <p:pic>
+        <p:nvPicPr>
+          <p:cNvPr id="12" name="Picture 11">
+            <a:extLst>
+              <a:ext uri="{FF2B5EF4-FFF2-40B4-BE49-F238E27FC236}">
+                <a16:creationId xmlns:a16="http://schemas.microsoft.com/office/drawing/2014/main" id="{2CCD89C7-6EBA-743A-9716-D7369682B812}"/>
+              </a:ext>
+            </a:extLst>
+          </p:cNvPr>
+          <p:cNvPicPr>
+            <a:picLocks noChangeAspect="1"/>
+          </p:cNvPicPr>
+          <p:nvPr/>
+        </p:nvPicPr>
+        <p:blipFill>
+          <a:blip r:embed="rId6"/>
+          <a:stretch>
+            <a:fillRect/>
+          </a:stretch>
+        </p:blipFill>
+        <p:spPr>
+          <a:xfrm>
+            <a:off x="6899312" y="5409586"/>
+            <a:ext cx="4299574" cy="874490"/>
+          </a:xfrm>
+          <a:prstGeom prst="rect">
+            <a:avLst/>
+          </a:prstGeom>
+        </p:spPr>
+      </p:pic>
+    </p:spTree>
+    <p:extLst>
+      <p:ext uri="{BB962C8B-B14F-4D97-AF65-F5344CB8AC3E}">
+        <p14:creationId xmlns:p14="http://schemas.microsoft.com/office/powerpoint/2010/main" val="1102999927"/>
+      </p:ext>
+    </p:extLst>
+  </p:cSld>
+  <p:clrMapOvr>
+    <a:masterClrMapping/>
+  </p:clrMapOvr>
+</p:sld>
+</file>
+
+<file path=ppt/slides/slide16.xml><?xml version="1.0" encoding="utf-8"?>
+<p:sld xmlns:a="http://schemas.openxmlformats.org/drawingml/2006/main" xmlns:r="http://schemas.openxmlformats.org/officeDocument/2006/relationships" xmlns:p="http://schemas.openxmlformats.org/presentationml/2006/main">
+  <p:cSld>
+    <p:spTree>
+      <p:nvGrpSpPr>
+        <p:cNvPr id="1" name=""/>
+        <p:cNvGrpSpPr/>
+        <p:nvPr/>
+      </p:nvGrpSpPr>
+      <p:grpSpPr>
+        <a:xfrm>
+          <a:off x="0" y="0"/>
+          <a:ext cx="0" cy="0"/>
+          <a:chOff x="0" y="0"/>
+          <a:chExt cx="0" cy="0"/>
+        </a:xfrm>
+      </p:grpSpPr>
+      <p:sp>
+        <p:nvSpPr>
+          <p:cNvPr id="2" name="Title 1">
+            <a:extLst>
+              <a:ext uri="{FF2B5EF4-FFF2-40B4-BE49-F238E27FC236}">
+                <a16:creationId xmlns:a16="http://schemas.microsoft.com/office/drawing/2014/main" id="{A1AAE40B-FFD2-11F4-B7DF-1FD576DD4AF7}"/>
+              </a:ext>
+            </a:extLst>
+          </p:cNvPr>
+          <p:cNvSpPr>
+            <a:spLocks noGrp="1"/>
+          </p:cNvSpPr>
+          <p:nvPr>
+            <p:ph type="title"/>
+          </p:nvPr>
+        </p:nvSpPr>
+        <p:spPr/>
+        <p:txBody>
+          <a:bodyPr/>
+          <a:lstStyle/>
+          <a:p>
+            <a:r>
+              <a:rPr lang="en-US" dirty="0"/>
+              <a:t>Actual analysis part 2</a:t>
+            </a:r>
+          </a:p>
+        </p:txBody>
+      </p:sp>
+      <p:pic>
+        <p:nvPicPr>
+          <p:cNvPr id="4" name="Picture 3" descr="A computer screen with numbers and text&#10;&#10;Description automatically generated">
+            <a:extLst>
+              <a:ext uri="{FF2B5EF4-FFF2-40B4-BE49-F238E27FC236}">
+                <a16:creationId xmlns:a16="http://schemas.microsoft.com/office/drawing/2014/main" id="{CD43C82A-37D7-0190-9333-C2A175F8B37C}"/>
+              </a:ext>
+            </a:extLst>
+          </p:cNvPr>
+          <p:cNvPicPr>
+            <a:picLocks noChangeAspect="1"/>
+          </p:cNvPicPr>
+          <p:nvPr/>
+        </p:nvPicPr>
+        <p:blipFill>
+          <a:blip r:embed="rId2"/>
+          <a:stretch>
+            <a:fillRect/>
+          </a:stretch>
+        </p:blipFill>
+        <p:spPr>
+          <a:xfrm>
+            <a:off x="575894" y="1953458"/>
+            <a:ext cx="3800000" cy="961905"/>
+          </a:xfrm>
+          <a:prstGeom prst="rect">
+            <a:avLst/>
+          </a:prstGeom>
+        </p:spPr>
+      </p:pic>
+      <p:pic>
+        <p:nvPicPr>
+          <p:cNvPr id="6" name="Picture 5" descr="A screen shot of a computer code&#10;&#10;Description automatically generated">
+            <a:extLst>
+              <a:ext uri="{FF2B5EF4-FFF2-40B4-BE49-F238E27FC236}">
+                <a16:creationId xmlns:a16="http://schemas.microsoft.com/office/drawing/2014/main" id="{D01AD6A0-A578-CC8C-6B19-66475F9F20D9}"/>
+              </a:ext>
+            </a:extLst>
+          </p:cNvPr>
+          <p:cNvPicPr>
+            <a:picLocks noChangeAspect="1"/>
+          </p:cNvPicPr>
+          <p:nvPr/>
+        </p:nvPicPr>
+        <p:blipFill>
+          <a:blip r:embed="rId3"/>
+          <a:stretch>
+            <a:fillRect/>
+          </a:stretch>
+        </p:blipFill>
+        <p:spPr>
+          <a:xfrm>
+            <a:off x="505256" y="3217198"/>
+            <a:ext cx="4890527" cy="961905"/>
+          </a:xfrm>
+          <a:prstGeom prst="rect">
+            <a:avLst/>
+          </a:prstGeom>
+        </p:spPr>
+      </p:pic>
+      <p:pic>
+        <p:nvPicPr>
+          <p:cNvPr id="8" name="Picture 7" descr="A screen shot of a computer code&#10;&#10;Description automatically generated">
+            <a:extLst>
+              <a:ext uri="{FF2B5EF4-FFF2-40B4-BE49-F238E27FC236}">
+                <a16:creationId xmlns:a16="http://schemas.microsoft.com/office/drawing/2014/main" id="{E6309043-049C-E705-3A4C-0AEFD39B76FF}"/>
+              </a:ext>
+            </a:extLst>
+          </p:cNvPr>
+          <p:cNvPicPr>
+            <a:picLocks noChangeAspect="1"/>
+          </p:cNvPicPr>
+          <p:nvPr/>
+        </p:nvPicPr>
+        <p:blipFill>
+          <a:blip r:embed="rId4"/>
+          <a:stretch>
+            <a:fillRect/>
+          </a:stretch>
+        </p:blipFill>
+        <p:spPr>
+          <a:xfrm>
+            <a:off x="457907" y="4538897"/>
+            <a:ext cx="6619048" cy="933333"/>
+          </a:xfrm>
+          <a:prstGeom prst="rect">
+            <a:avLst/>
+          </a:prstGeom>
+        </p:spPr>
+      </p:pic>
+      <p:pic>
+        <p:nvPicPr>
+          <p:cNvPr id="10" name="Picture 9" descr="A screen shot of a computer&#10;&#10;Description automatically generated">
+            <a:extLst>
+              <a:ext uri="{FF2B5EF4-FFF2-40B4-BE49-F238E27FC236}">
+                <a16:creationId xmlns:a16="http://schemas.microsoft.com/office/drawing/2014/main" id="{6504B34D-898A-C3B5-D7C0-A47B6126C758}"/>
+              </a:ext>
+            </a:extLst>
+          </p:cNvPr>
+          <p:cNvPicPr>
+            <a:picLocks noChangeAspect="1"/>
+          </p:cNvPicPr>
+          <p:nvPr/>
+        </p:nvPicPr>
+        <p:blipFill>
+          <a:blip r:embed="rId5"/>
+          <a:stretch>
+            <a:fillRect/>
+          </a:stretch>
+        </p:blipFill>
+        <p:spPr>
+          <a:xfrm>
+            <a:off x="4267200" y="2260963"/>
+            <a:ext cx="7419543" cy="1052634"/>
+          </a:xfrm>
+          <a:prstGeom prst="rect">
+            <a:avLst/>
+          </a:prstGeom>
+        </p:spPr>
+      </p:pic>
+      <p:pic>
+        <p:nvPicPr>
+          <p:cNvPr id="12" name="Picture 11" descr="A black background with white text&#10;&#10;Description automatically generated">
+            <a:extLst>
+              <a:ext uri="{FF2B5EF4-FFF2-40B4-BE49-F238E27FC236}">
+                <a16:creationId xmlns:a16="http://schemas.microsoft.com/office/drawing/2014/main" id="{77D760BD-A044-D112-DEC8-894CDF3D2544}"/>
+              </a:ext>
+            </a:extLst>
+          </p:cNvPr>
+          <p:cNvPicPr>
+            <a:picLocks noChangeAspect="1"/>
+          </p:cNvPicPr>
+          <p:nvPr/>
+        </p:nvPicPr>
+        <p:blipFill>
+          <a:blip r:embed="rId6"/>
+          <a:stretch>
+            <a:fillRect/>
+          </a:stretch>
+        </p:blipFill>
+        <p:spPr>
+          <a:xfrm>
+            <a:off x="4433477" y="3863364"/>
+            <a:ext cx="6912950" cy="679071"/>
+          </a:xfrm>
+          <a:prstGeom prst="rect">
+            <a:avLst/>
+          </a:prstGeom>
+        </p:spPr>
+      </p:pic>
+      <p:pic>
+        <p:nvPicPr>
+          <p:cNvPr id="14" name="Picture 13" descr="A screenshot of a computer&#10;&#10;Description automatically generated">
+            <a:extLst>
+              <a:ext uri="{FF2B5EF4-FFF2-40B4-BE49-F238E27FC236}">
+                <a16:creationId xmlns:a16="http://schemas.microsoft.com/office/drawing/2014/main" id="{38978657-D161-A82C-C5A4-DB2DF5B3DA25}"/>
+              </a:ext>
+            </a:extLst>
+          </p:cNvPr>
+          <p:cNvPicPr>
+            <a:picLocks noChangeAspect="1"/>
+          </p:cNvPicPr>
+          <p:nvPr/>
+        </p:nvPicPr>
+        <p:blipFill>
+          <a:blip r:embed="rId7"/>
+          <a:stretch>
+            <a:fillRect/>
+          </a:stretch>
+        </p:blipFill>
+        <p:spPr>
+          <a:xfrm>
+            <a:off x="4006185" y="5472230"/>
+            <a:ext cx="7599325" cy="1098698"/>
+          </a:xfrm>
+          <a:prstGeom prst="rect">
+            <a:avLst/>
+          </a:prstGeom>
+        </p:spPr>
+      </p:pic>
+    </p:spTree>
+    <p:extLst>
+      <p:ext uri="{BB962C8B-B14F-4D97-AF65-F5344CB8AC3E}">
+        <p14:creationId xmlns:p14="http://schemas.microsoft.com/office/powerpoint/2010/main" val="364100726"/>
+      </p:ext>
+    </p:extLst>
+  </p:cSld>
+  <p:clrMapOvr>
+    <a:masterClrMapping/>
+  </p:clrMapOvr>
+</p:sld>
+</file>
+
+<file path=ppt/slides/slide17.xml><?xml version="1.0" encoding="utf-8"?>
+<p:sld xmlns:a="http://schemas.openxmlformats.org/drawingml/2006/main" xmlns:r="http://schemas.openxmlformats.org/officeDocument/2006/relationships" xmlns:p="http://schemas.openxmlformats.org/presentationml/2006/main">
+  <p:cSld>
+    <p:spTree>
+      <p:nvGrpSpPr>
+        <p:cNvPr id="1" name=""/>
+        <p:cNvGrpSpPr/>
+        <p:nvPr/>
+      </p:nvGrpSpPr>
+      <p:grpSpPr>
+        <a:xfrm>
+          <a:off x="0" y="0"/>
+          <a:ext cx="0" cy="0"/>
+          <a:chOff x="0" y="0"/>
+          <a:chExt cx="0" cy="0"/>
+        </a:xfrm>
+      </p:grpSpPr>
+      <p:sp>
+        <p:nvSpPr>
+          <p:cNvPr id="2" name="Title 1">
+            <a:extLst>
+              <a:ext uri="{FF2B5EF4-FFF2-40B4-BE49-F238E27FC236}">
+                <a16:creationId xmlns:a16="http://schemas.microsoft.com/office/drawing/2014/main" id="{A1AAE40B-FFD2-11F4-B7DF-1FD576DD4AF7}"/>
+              </a:ext>
+            </a:extLst>
+          </p:cNvPr>
+          <p:cNvSpPr>
+            <a:spLocks noGrp="1"/>
+          </p:cNvSpPr>
+          <p:nvPr>
+            <p:ph type="title"/>
+          </p:nvPr>
+        </p:nvSpPr>
+        <p:spPr/>
+        <p:txBody>
+          <a:bodyPr/>
+          <a:lstStyle/>
+          <a:p>
+            <a:r>
+              <a:rPr lang="en-US" dirty="0"/>
+              <a:t>Overlaying the two graphs part 1</a:t>
+            </a:r>
+          </a:p>
+        </p:txBody>
+      </p:sp>
+      <p:pic>
+        <p:nvPicPr>
+          <p:cNvPr id="4" name="Picture 3">
+            <a:extLst>
+              <a:ext uri="{FF2B5EF4-FFF2-40B4-BE49-F238E27FC236}">
+                <a16:creationId xmlns:a16="http://schemas.microsoft.com/office/drawing/2014/main" id="{BAB52FC2-0437-39A8-EA83-296E85533A0C}"/>
+              </a:ext>
+            </a:extLst>
+          </p:cNvPr>
+          <p:cNvPicPr>
+            <a:picLocks noChangeAspect="1"/>
+          </p:cNvPicPr>
+          <p:nvPr/>
+        </p:nvPicPr>
+        <p:blipFill>
+          <a:blip r:embed="rId2"/>
+          <a:stretch>
+            <a:fillRect/>
+          </a:stretch>
+        </p:blipFill>
+        <p:spPr>
+          <a:xfrm>
+            <a:off x="682626" y="2125875"/>
+            <a:ext cx="3295238" cy="447619"/>
+          </a:xfrm>
+          <a:prstGeom prst="rect">
+            <a:avLst/>
+          </a:prstGeom>
+        </p:spPr>
+      </p:pic>
+      <p:pic>
+        <p:nvPicPr>
+          <p:cNvPr id="6" name="Picture 5" descr="A screenshot of a computer screen&#10;&#10;Description automatically generated">
+            <a:extLst>
+              <a:ext uri="{FF2B5EF4-FFF2-40B4-BE49-F238E27FC236}">
+                <a16:creationId xmlns:a16="http://schemas.microsoft.com/office/drawing/2014/main" id="{1AF2141E-253F-0A4A-5999-48D4E34D1AE8}"/>
+              </a:ext>
+            </a:extLst>
+          </p:cNvPr>
+          <p:cNvPicPr>
+            <a:picLocks noChangeAspect="1"/>
+          </p:cNvPicPr>
+          <p:nvPr/>
+        </p:nvPicPr>
+        <p:blipFill>
+          <a:blip r:embed="rId3"/>
+          <a:stretch>
+            <a:fillRect/>
+          </a:stretch>
+        </p:blipFill>
+        <p:spPr>
+          <a:xfrm>
+            <a:off x="2650480" y="2848896"/>
+            <a:ext cx="8542857" cy="3542857"/>
+          </a:xfrm>
+          <a:prstGeom prst="rect">
+            <a:avLst/>
+          </a:prstGeom>
+        </p:spPr>
+      </p:pic>
+    </p:spTree>
+    <p:extLst>
+      <p:ext uri="{BB962C8B-B14F-4D97-AF65-F5344CB8AC3E}">
+        <p14:creationId xmlns:p14="http://schemas.microsoft.com/office/powerpoint/2010/main" val="3051535869"/>
+      </p:ext>
+    </p:extLst>
+  </p:cSld>
+  <p:clrMapOvr>
+    <a:masterClrMapping/>
+  </p:clrMapOvr>
+</p:sld>
+</file>
+
+<file path=ppt/slides/slide18.xml><?xml version="1.0" encoding="utf-8"?>
+<p:sld xmlns:a="http://schemas.openxmlformats.org/drawingml/2006/main" xmlns:r="http://schemas.openxmlformats.org/officeDocument/2006/relationships" xmlns:p="http://schemas.openxmlformats.org/presentationml/2006/main">
+  <p:cSld>
+    <p:spTree>
+      <p:nvGrpSpPr>
+        <p:cNvPr id="1" name=""/>
+        <p:cNvGrpSpPr/>
+        <p:nvPr/>
+      </p:nvGrpSpPr>
+      <p:grpSpPr>
+        <a:xfrm>
+          <a:off x="0" y="0"/>
+          <a:ext cx="0" cy="0"/>
+          <a:chOff x="0" y="0"/>
+          <a:chExt cx="0" cy="0"/>
+        </a:xfrm>
+      </p:grpSpPr>
+      <p:sp>
+        <p:nvSpPr>
+          <p:cNvPr id="2" name="Title 1">
+            <a:extLst>
+              <a:ext uri="{FF2B5EF4-FFF2-40B4-BE49-F238E27FC236}">
+                <a16:creationId xmlns:a16="http://schemas.microsoft.com/office/drawing/2014/main" id="{A1AAE40B-FFD2-11F4-B7DF-1FD576DD4AF7}"/>
+              </a:ext>
+            </a:extLst>
+          </p:cNvPr>
+          <p:cNvSpPr>
+            <a:spLocks noGrp="1"/>
+          </p:cNvSpPr>
+          <p:nvPr>
+            <p:ph type="title"/>
+          </p:nvPr>
+        </p:nvSpPr>
+        <p:spPr/>
+        <p:txBody>
+          <a:bodyPr/>
+          <a:lstStyle/>
+          <a:p>
+            <a:r>
+              <a:rPr lang="en-US" dirty="0"/>
+              <a:t>Overlaying the two graphs part 2</a:t>
+            </a:r>
+          </a:p>
+        </p:txBody>
+      </p:sp>
+      <p:pic>
+        <p:nvPicPr>
+          <p:cNvPr id="4" name="Picture 3" descr="A screen shot of a computer&#10;&#10;Description automatically generated">
+            <a:extLst>
+              <a:ext uri="{FF2B5EF4-FFF2-40B4-BE49-F238E27FC236}">
+                <a16:creationId xmlns:a16="http://schemas.microsoft.com/office/drawing/2014/main" id="{EB8FDD72-5272-237F-1482-9FC3496BF017}"/>
+              </a:ext>
+            </a:extLst>
+          </p:cNvPr>
+          <p:cNvPicPr>
+            <a:picLocks noChangeAspect="1"/>
+          </p:cNvPicPr>
+          <p:nvPr/>
+        </p:nvPicPr>
+        <p:blipFill>
+          <a:blip r:embed="rId2"/>
+          <a:stretch>
+            <a:fillRect/>
+          </a:stretch>
+        </p:blipFill>
+        <p:spPr>
+          <a:xfrm>
+            <a:off x="740230" y="2234417"/>
+            <a:ext cx="5638095" cy="1333333"/>
+          </a:xfrm>
+          <a:prstGeom prst="rect">
+            <a:avLst/>
+          </a:prstGeom>
+        </p:spPr>
+      </p:pic>
+      <p:pic>
+        <p:nvPicPr>
+          <p:cNvPr id="6" name="Picture 5" descr="A graph with a red line&#10;&#10;Description automatically generated">
+            <a:extLst>
+              <a:ext uri="{FF2B5EF4-FFF2-40B4-BE49-F238E27FC236}">
+                <a16:creationId xmlns:a16="http://schemas.microsoft.com/office/drawing/2014/main" id="{8193A46B-9016-E4E9-3693-F407460C4547}"/>
+              </a:ext>
+            </a:extLst>
+          </p:cNvPr>
+          <p:cNvPicPr>
+            <a:picLocks noChangeAspect="1"/>
+          </p:cNvPicPr>
+          <p:nvPr/>
+        </p:nvPicPr>
+        <p:blipFill>
+          <a:blip r:embed="rId3"/>
+          <a:stretch>
+            <a:fillRect/>
+          </a:stretch>
+        </p:blipFill>
+        <p:spPr>
+          <a:xfrm>
+            <a:off x="4540011" y="3090247"/>
+            <a:ext cx="6828571" cy="3038095"/>
+          </a:xfrm>
+          <a:prstGeom prst="rect">
+            <a:avLst/>
+          </a:prstGeom>
+        </p:spPr>
+      </p:pic>
+    </p:spTree>
+    <p:extLst>
+      <p:ext uri="{BB962C8B-B14F-4D97-AF65-F5344CB8AC3E}">
+        <p14:creationId xmlns:p14="http://schemas.microsoft.com/office/powerpoint/2010/main" val="3040640550"/>
+      </p:ext>
+    </p:extLst>
+  </p:cSld>
+  <p:clrMapOvr>
+    <a:masterClrMapping/>
+  </p:clrMapOvr>
+</p:sld>
+</file>
+
+<file path=ppt/slides/slide19.xml><?xml version="1.0" encoding="utf-8"?>
+<p:sld xmlns:a="http://schemas.openxmlformats.org/drawingml/2006/main" xmlns:r="http://schemas.openxmlformats.org/officeDocument/2006/relationships" xmlns:p="http://schemas.openxmlformats.org/presentationml/2006/main">
+  <p:cSld>
+    <p:spTree>
+      <p:nvGrpSpPr>
+        <p:cNvPr id="1" name=""/>
+        <p:cNvGrpSpPr/>
+        <p:nvPr/>
+      </p:nvGrpSpPr>
+      <p:grpSpPr>
+        <a:xfrm>
+          <a:off x="0" y="0"/>
+          <a:ext cx="0" cy="0"/>
+          <a:chOff x="0" y="0"/>
+          <a:chExt cx="0" cy="0"/>
+        </a:xfrm>
+      </p:grpSpPr>
+      <p:sp>
+        <p:nvSpPr>
+          <p:cNvPr id="2" name="Title 1">
+            <a:extLst>
+              <a:ext uri="{FF2B5EF4-FFF2-40B4-BE49-F238E27FC236}">
+                <a16:creationId xmlns:a16="http://schemas.microsoft.com/office/drawing/2014/main" id="{A1AAE40B-FFD2-11F4-B7DF-1FD576DD4AF7}"/>
+              </a:ext>
+            </a:extLst>
+          </p:cNvPr>
+          <p:cNvSpPr>
+            <a:spLocks noGrp="1"/>
+          </p:cNvSpPr>
+          <p:nvPr>
+            <p:ph type="title"/>
+          </p:nvPr>
+        </p:nvSpPr>
+        <p:spPr/>
+        <p:txBody>
+          <a:bodyPr/>
+          <a:lstStyle/>
+          <a:p>
+            <a:r>
+              <a:rPr lang="en-US" dirty="0"/>
+              <a:t>Overlaying the two graphs part 3</a:t>
+            </a:r>
+          </a:p>
+        </p:txBody>
+      </p:sp>
+      <p:pic>
+        <p:nvPicPr>
+          <p:cNvPr id="4" name="Picture 3">
+            <a:extLst>
+              <a:ext uri="{FF2B5EF4-FFF2-40B4-BE49-F238E27FC236}">
+                <a16:creationId xmlns:a16="http://schemas.microsoft.com/office/drawing/2014/main" id="{85E9C7A6-FCEF-FD9B-7254-C5106B9FF4B7}"/>
+              </a:ext>
+            </a:extLst>
+          </p:cNvPr>
+          <p:cNvPicPr>
+            <a:picLocks noChangeAspect="1"/>
+          </p:cNvPicPr>
+          <p:nvPr/>
+        </p:nvPicPr>
+        <p:blipFill>
+          <a:blip r:embed="rId2"/>
+          <a:stretch>
+            <a:fillRect/>
+          </a:stretch>
+        </p:blipFill>
+        <p:spPr>
+          <a:xfrm>
+            <a:off x="3374237" y="5516112"/>
+            <a:ext cx="5443526" cy="612230"/>
+          </a:xfrm>
+          <a:prstGeom prst="rect">
+            <a:avLst/>
+          </a:prstGeom>
+        </p:spPr>
+      </p:pic>
+      <p:pic>
+        <p:nvPicPr>
+          <p:cNvPr id="6" name="Picture 5" descr="A graph with blue dots and red line&#10;&#10;Description automatically generated">
+            <a:extLst>
+              <a:ext uri="{FF2B5EF4-FFF2-40B4-BE49-F238E27FC236}">
+                <a16:creationId xmlns:a16="http://schemas.microsoft.com/office/drawing/2014/main" id="{3602483E-2273-E9B0-398B-5154B9946D17}"/>
+              </a:ext>
+            </a:extLst>
+          </p:cNvPr>
+          <p:cNvPicPr>
+            <a:picLocks noChangeAspect="1"/>
+          </p:cNvPicPr>
+          <p:nvPr/>
+        </p:nvPicPr>
+        <p:blipFill>
+          <a:blip r:embed="rId3"/>
+          <a:stretch>
+            <a:fillRect/>
+          </a:stretch>
+        </p:blipFill>
+        <p:spPr>
+          <a:xfrm>
+            <a:off x="2267738" y="1991516"/>
+            <a:ext cx="7656523" cy="3385102"/>
+          </a:xfrm>
+          <a:prstGeom prst="rect">
+            <a:avLst/>
+          </a:prstGeom>
+        </p:spPr>
+      </p:pic>
+    </p:spTree>
+    <p:extLst>
+      <p:ext uri="{BB962C8B-B14F-4D97-AF65-F5344CB8AC3E}">
+        <p14:creationId xmlns:p14="http://schemas.microsoft.com/office/powerpoint/2010/main" val="3369258395"/>
+      </p:ext>
+    </p:extLst>
+  </p:cSld>
+  <p:clrMapOvr>
+    <a:masterClrMapping/>
+  </p:clrMapOvr>
+</p:sld>
+</file>
+
 <file path=ppt/slides/slide2.xml><?xml version="1.0" encoding="utf-8"?>
 <p:sld xmlns:a="http://schemas.openxmlformats.org/drawingml/2006/main" xmlns:r="http://schemas.openxmlformats.org/officeDocument/2006/relationships" xmlns:p="http://schemas.openxmlformats.org/presentationml/2006/main">
   <p:cSld>
@@ -4754,6 +6170,603 @@
     <p:extLst>
       <p:ext uri="{BB962C8B-B14F-4D97-AF65-F5344CB8AC3E}">
         <p14:creationId xmlns:p14="http://schemas.microsoft.com/office/powerpoint/2010/main" val="44590288"/>
+      </p:ext>
+    </p:extLst>
+  </p:cSld>
+  <p:clrMapOvr>
+    <a:masterClrMapping/>
+  </p:clrMapOvr>
+</p:sld>
+</file>
+
+<file path=ppt/slides/slide20.xml><?xml version="1.0" encoding="utf-8"?>
+<p:sld xmlns:a="http://schemas.openxmlformats.org/drawingml/2006/main" xmlns:r="http://schemas.openxmlformats.org/officeDocument/2006/relationships" xmlns:p="http://schemas.openxmlformats.org/presentationml/2006/main">
+  <p:cSld>
+    <p:spTree>
+      <p:nvGrpSpPr>
+        <p:cNvPr id="1" name=""/>
+        <p:cNvGrpSpPr/>
+        <p:nvPr/>
+      </p:nvGrpSpPr>
+      <p:grpSpPr>
+        <a:xfrm>
+          <a:off x="0" y="0"/>
+          <a:ext cx="0" cy="0"/>
+          <a:chOff x="0" y="0"/>
+          <a:chExt cx="0" cy="0"/>
+        </a:xfrm>
+      </p:grpSpPr>
+      <p:sp>
+        <p:nvSpPr>
+          <p:cNvPr id="2" name="Title 1">
+            <a:extLst>
+              <a:ext uri="{FF2B5EF4-FFF2-40B4-BE49-F238E27FC236}">
+                <a16:creationId xmlns:a16="http://schemas.microsoft.com/office/drawing/2014/main" id="{A1AAE40B-FFD2-11F4-B7DF-1FD576DD4AF7}"/>
+              </a:ext>
+            </a:extLst>
+          </p:cNvPr>
+          <p:cNvSpPr>
+            <a:spLocks noGrp="1"/>
+          </p:cNvSpPr>
+          <p:nvPr>
+            <p:ph type="title"/>
+          </p:nvPr>
+        </p:nvSpPr>
+        <p:spPr/>
+        <p:txBody>
+          <a:bodyPr/>
+          <a:lstStyle/>
+          <a:p>
+            <a:r>
+              <a:rPr lang="en-US" dirty="0"/>
+              <a:t>Cross validation and </a:t>
+            </a:r>
+            <a:r>
+              <a:rPr lang="en-US" dirty="0" err="1"/>
+              <a:t>rmse</a:t>
+            </a:r>
+            <a:r>
+              <a:rPr lang="en-US" dirty="0"/>
+              <a:t>, relocate?</a:t>
+            </a:r>
+          </a:p>
+        </p:txBody>
+      </p:sp>
+      <p:pic>
+        <p:nvPicPr>
+          <p:cNvPr id="4" name="Picture 3" descr="A computer screen shot of a program&#10;&#10;Description automatically generated">
+            <a:extLst>
+              <a:ext uri="{FF2B5EF4-FFF2-40B4-BE49-F238E27FC236}">
+                <a16:creationId xmlns:a16="http://schemas.microsoft.com/office/drawing/2014/main" id="{A0C022F1-7D97-2E2A-38F7-31F635DED314}"/>
+              </a:ext>
+            </a:extLst>
+          </p:cNvPr>
+          <p:cNvPicPr>
+            <a:picLocks noChangeAspect="1"/>
+          </p:cNvPicPr>
+          <p:nvPr/>
+        </p:nvPicPr>
+        <p:blipFill>
+          <a:blip r:embed="rId2"/>
+          <a:stretch>
+            <a:fillRect/>
+          </a:stretch>
+        </p:blipFill>
+        <p:spPr>
+          <a:xfrm>
+            <a:off x="862292" y="2392447"/>
+            <a:ext cx="10467415" cy="2533515"/>
+          </a:xfrm>
+          <a:prstGeom prst="rect">
+            <a:avLst/>
+          </a:prstGeom>
+        </p:spPr>
+      </p:pic>
+    </p:spTree>
+    <p:extLst>
+      <p:ext uri="{BB962C8B-B14F-4D97-AF65-F5344CB8AC3E}">
+        <p14:creationId xmlns:p14="http://schemas.microsoft.com/office/powerpoint/2010/main" val="386892563"/>
+      </p:ext>
+    </p:extLst>
+  </p:cSld>
+  <p:clrMapOvr>
+    <a:masterClrMapping/>
+  </p:clrMapOvr>
+</p:sld>
+</file>
+
+<file path=ppt/slides/slide21.xml><?xml version="1.0" encoding="utf-8"?>
+<p:sld xmlns:a="http://schemas.openxmlformats.org/drawingml/2006/main" xmlns:r="http://schemas.openxmlformats.org/officeDocument/2006/relationships" xmlns:p="http://schemas.openxmlformats.org/presentationml/2006/main">
+  <p:cSld>
+    <p:spTree>
+      <p:nvGrpSpPr>
+        <p:cNvPr id="1" name=""/>
+        <p:cNvGrpSpPr/>
+        <p:nvPr/>
+      </p:nvGrpSpPr>
+      <p:grpSpPr>
+        <a:xfrm>
+          <a:off x="0" y="0"/>
+          <a:ext cx="0" cy="0"/>
+          <a:chOff x="0" y="0"/>
+          <a:chExt cx="0" cy="0"/>
+        </a:xfrm>
+      </p:grpSpPr>
+      <p:sp>
+        <p:nvSpPr>
+          <p:cNvPr id="2" name="Title 1">
+            <a:extLst>
+              <a:ext uri="{FF2B5EF4-FFF2-40B4-BE49-F238E27FC236}">
+                <a16:creationId xmlns:a16="http://schemas.microsoft.com/office/drawing/2014/main" id="{A1AAE40B-FFD2-11F4-B7DF-1FD576DD4AF7}"/>
+              </a:ext>
+            </a:extLst>
+          </p:cNvPr>
+          <p:cNvSpPr>
+            <a:spLocks noGrp="1"/>
+          </p:cNvSpPr>
+          <p:nvPr>
+            <p:ph type="title"/>
+          </p:nvPr>
+        </p:nvSpPr>
+        <p:spPr/>
+        <p:txBody>
+          <a:bodyPr/>
+          <a:lstStyle/>
+          <a:p>
+            <a:endParaRPr lang="en-US"/>
+          </a:p>
+        </p:txBody>
+      </p:sp>
+    </p:spTree>
+    <p:extLst>
+      <p:ext uri="{BB962C8B-B14F-4D97-AF65-F5344CB8AC3E}">
+        <p14:creationId xmlns:p14="http://schemas.microsoft.com/office/powerpoint/2010/main" val="1132390111"/>
+      </p:ext>
+    </p:extLst>
+  </p:cSld>
+  <p:clrMapOvr>
+    <a:masterClrMapping/>
+  </p:clrMapOvr>
+</p:sld>
+</file>
+
+<file path=ppt/slides/slide22.xml><?xml version="1.0" encoding="utf-8"?>
+<p:sld xmlns:a="http://schemas.openxmlformats.org/drawingml/2006/main" xmlns:r="http://schemas.openxmlformats.org/officeDocument/2006/relationships" xmlns:p="http://schemas.openxmlformats.org/presentationml/2006/main">
+  <p:cSld>
+    <p:spTree>
+      <p:nvGrpSpPr>
+        <p:cNvPr id="1" name=""/>
+        <p:cNvGrpSpPr/>
+        <p:nvPr/>
+      </p:nvGrpSpPr>
+      <p:grpSpPr>
+        <a:xfrm>
+          <a:off x="0" y="0"/>
+          <a:ext cx="0" cy="0"/>
+          <a:chOff x="0" y="0"/>
+          <a:chExt cx="0" cy="0"/>
+        </a:xfrm>
+      </p:grpSpPr>
+      <p:sp>
+        <p:nvSpPr>
+          <p:cNvPr id="2" name="Title 1">
+            <a:extLst>
+              <a:ext uri="{FF2B5EF4-FFF2-40B4-BE49-F238E27FC236}">
+                <a16:creationId xmlns:a16="http://schemas.microsoft.com/office/drawing/2014/main" id="{A1AAE40B-FFD2-11F4-B7DF-1FD576DD4AF7}"/>
+              </a:ext>
+            </a:extLst>
+          </p:cNvPr>
+          <p:cNvSpPr>
+            <a:spLocks noGrp="1"/>
+          </p:cNvSpPr>
+          <p:nvPr>
+            <p:ph type="title"/>
+          </p:nvPr>
+        </p:nvSpPr>
+        <p:spPr/>
+        <p:txBody>
+          <a:bodyPr/>
+          <a:lstStyle/>
+          <a:p>
+            <a:endParaRPr lang="en-US"/>
+          </a:p>
+        </p:txBody>
+      </p:sp>
+    </p:spTree>
+    <p:extLst>
+      <p:ext uri="{BB962C8B-B14F-4D97-AF65-F5344CB8AC3E}">
+        <p14:creationId xmlns:p14="http://schemas.microsoft.com/office/powerpoint/2010/main" val="36372486"/>
+      </p:ext>
+    </p:extLst>
+  </p:cSld>
+  <p:clrMapOvr>
+    <a:masterClrMapping/>
+  </p:clrMapOvr>
+</p:sld>
+</file>
+
+<file path=ppt/slides/slide23.xml><?xml version="1.0" encoding="utf-8"?>
+<p:sld xmlns:a="http://schemas.openxmlformats.org/drawingml/2006/main" xmlns:r="http://schemas.openxmlformats.org/officeDocument/2006/relationships" xmlns:p="http://schemas.openxmlformats.org/presentationml/2006/main">
+  <p:cSld>
+    <p:spTree>
+      <p:nvGrpSpPr>
+        <p:cNvPr id="1" name=""/>
+        <p:cNvGrpSpPr/>
+        <p:nvPr/>
+      </p:nvGrpSpPr>
+      <p:grpSpPr>
+        <a:xfrm>
+          <a:off x="0" y="0"/>
+          <a:ext cx="0" cy="0"/>
+          <a:chOff x="0" y="0"/>
+          <a:chExt cx="0" cy="0"/>
+        </a:xfrm>
+      </p:grpSpPr>
+      <p:sp>
+        <p:nvSpPr>
+          <p:cNvPr id="2" name="Title 1">
+            <a:extLst>
+              <a:ext uri="{FF2B5EF4-FFF2-40B4-BE49-F238E27FC236}">
+                <a16:creationId xmlns:a16="http://schemas.microsoft.com/office/drawing/2014/main" id="{A1AAE40B-FFD2-11F4-B7DF-1FD576DD4AF7}"/>
+              </a:ext>
+            </a:extLst>
+          </p:cNvPr>
+          <p:cNvSpPr>
+            <a:spLocks noGrp="1"/>
+          </p:cNvSpPr>
+          <p:nvPr>
+            <p:ph type="title"/>
+          </p:nvPr>
+        </p:nvSpPr>
+        <p:spPr/>
+        <p:txBody>
+          <a:bodyPr/>
+          <a:lstStyle/>
+          <a:p>
+            <a:r>
+              <a:rPr lang="en-US" dirty="0"/>
+              <a:t>End of slide,  add more below!!</a:t>
+            </a:r>
+          </a:p>
+        </p:txBody>
+      </p:sp>
+    </p:spTree>
+    <p:extLst>
+      <p:ext uri="{BB962C8B-B14F-4D97-AF65-F5344CB8AC3E}">
+        <p14:creationId xmlns:p14="http://schemas.microsoft.com/office/powerpoint/2010/main" val="600712652"/>
+      </p:ext>
+    </p:extLst>
+  </p:cSld>
+  <p:clrMapOvr>
+    <a:masterClrMapping/>
+  </p:clrMapOvr>
+</p:sld>
+</file>
+
+<file path=ppt/slides/slide24.xml><?xml version="1.0" encoding="utf-8"?>
+<p:sld xmlns:a="http://schemas.openxmlformats.org/drawingml/2006/main" xmlns:r="http://schemas.openxmlformats.org/officeDocument/2006/relationships" xmlns:p="http://schemas.openxmlformats.org/presentationml/2006/main">
+  <p:cSld>
+    <p:spTree>
+      <p:nvGrpSpPr>
+        <p:cNvPr id="1" name=""/>
+        <p:cNvGrpSpPr/>
+        <p:nvPr/>
+      </p:nvGrpSpPr>
+      <p:grpSpPr>
+        <a:xfrm>
+          <a:off x="0" y="0"/>
+          <a:ext cx="0" cy="0"/>
+          <a:chOff x="0" y="0"/>
+          <a:chExt cx="0" cy="0"/>
+        </a:xfrm>
+      </p:grpSpPr>
+      <p:sp>
+        <p:nvSpPr>
+          <p:cNvPr id="2" name="Title 1">
+            <a:extLst>
+              <a:ext uri="{FF2B5EF4-FFF2-40B4-BE49-F238E27FC236}">
+                <a16:creationId xmlns:a16="http://schemas.microsoft.com/office/drawing/2014/main" id="{A1AAE40B-FFD2-11F4-B7DF-1FD576DD4AF7}"/>
+              </a:ext>
+            </a:extLst>
+          </p:cNvPr>
+          <p:cNvSpPr>
+            <a:spLocks noGrp="1"/>
+          </p:cNvSpPr>
+          <p:nvPr>
+            <p:ph type="title"/>
+          </p:nvPr>
+        </p:nvSpPr>
+        <p:spPr/>
+        <p:txBody>
+          <a:bodyPr/>
+          <a:lstStyle/>
+          <a:p>
+            <a:r>
+              <a:rPr lang="en-US" dirty="0"/>
+              <a:t>The end</a:t>
+            </a:r>
+          </a:p>
+        </p:txBody>
+      </p:sp>
+      <p:sp>
+        <p:nvSpPr>
+          <p:cNvPr id="3" name="TextBox 2">
+            <a:extLst>
+              <a:ext uri="{FF2B5EF4-FFF2-40B4-BE49-F238E27FC236}">
+                <a16:creationId xmlns:a16="http://schemas.microsoft.com/office/drawing/2014/main" id="{C83B9B75-4AC9-28C2-9E71-4E33B697F81E}"/>
+              </a:ext>
+            </a:extLst>
+          </p:cNvPr>
+          <p:cNvSpPr txBox="1"/>
+          <p:nvPr/>
+        </p:nvSpPr>
+        <p:spPr>
+          <a:xfrm>
+            <a:off x="3303257" y="3163529"/>
+            <a:ext cx="5574890" cy="1323439"/>
+          </a:xfrm>
+          <a:prstGeom prst="rect">
+            <a:avLst/>
+          </a:prstGeom>
+          <a:noFill/>
+        </p:spPr>
+        <p:txBody>
+          <a:bodyPr wrap="square" rtlCol="0">
+            <a:spAutoFit/>
+          </a:bodyPr>
+          <a:lstStyle/>
+          <a:p>
+            <a:r>
+              <a:rPr lang="en-US" sz="8000" dirty="0"/>
+              <a:t>Questions??</a:t>
+            </a:r>
+          </a:p>
+        </p:txBody>
+      </p:sp>
+    </p:spTree>
+    <p:extLst>
+      <p:ext uri="{BB962C8B-B14F-4D97-AF65-F5344CB8AC3E}">
+        <p14:creationId xmlns:p14="http://schemas.microsoft.com/office/powerpoint/2010/main" val="2903091187"/>
+      </p:ext>
+    </p:extLst>
+  </p:cSld>
+  <p:clrMapOvr>
+    <a:masterClrMapping/>
+  </p:clrMapOvr>
+</p:sld>
+</file>
+
+<file path=ppt/slides/slide25.xml><?xml version="1.0" encoding="utf-8"?>
+<p:sld xmlns:a="http://schemas.openxmlformats.org/drawingml/2006/main" xmlns:r="http://schemas.openxmlformats.org/officeDocument/2006/relationships" xmlns:p="http://schemas.openxmlformats.org/presentationml/2006/main">
+  <p:cSld>
+    <p:spTree>
+      <p:nvGrpSpPr>
+        <p:cNvPr id="1" name=""/>
+        <p:cNvGrpSpPr/>
+        <p:nvPr/>
+      </p:nvGrpSpPr>
+      <p:grpSpPr>
+        <a:xfrm>
+          <a:off x="0" y="0"/>
+          <a:ext cx="0" cy="0"/>
+          <a:chOff x="0" y="0"/>
+          <a:chExt cx="0" cy="0"/>
+        </a:xfrm>
+      </p:grpSpPr>
+      <p:pic>
+        <p:nvPicPr>
+          <p:cNvPr id="3" name="Picture 2" descr="A red circle with white text&#10;&#10;Description automatically generated">
+            <a:extLst>
+              <a:ext uri="{FF2B5EF4-FFF2-40B4-BE49-F238E27FC236}">
+                <a16:creationId xmlns:a16="http://schemas.microsoft.com/office/drawing/2014/main" id="{6A916E91-743A-3C73-F3EB-D2AB755BC9BC}"/>
+              </a:ext>
+            </a:extLst>
+          </p:cNvPr>
+          <p:cNvPicPr>
+            <a:picLocks noChangeAspect="1"/>
+          </p:cNvPicPr>
+          <p:nvPr/>
+        </p:nvPicPr>
+        <p:blipFill>
+          <a:blip r:embed="rId2"/>
+          <a:stretch>
+            <a:fillRect/>
+          </a:stretch>
+        </p:blipFill>
+        <p:spPr>
+          <a:xfrm>
+            <a:off x="2451469" y="1005915"/>
+            <a:ext cx="7289062" cy="4846170"/>
+          </a:xfrm>
+          <a:prstGeom prst="rect">
+            <a:avLst/>
+          </a:prstGeom>
+        </p:spPr>
+      </p:pic>
+    </p:spTree>
+    <p:extLst>
+      <p:ext uri="{BB962C8B-B14F-4D97-AF65-F5344CB8AC3E}">
+        <p14:creationId xmlns:p14="http://schemas.microsoft.com/office/powerpoint/2010/main" val="140845752"/>
+      </p:ext>
+    </p:extLst>
+  </p:cSld>
+  <p:clrMapOvr>
+    <a:masterClrMapping/>
+  </p:clrMapOvr>
+</p:sld>
+</file>
+
+<file path=ppt/slides/slide26.xml><?xml version="1.0" encoding="utf-8"?>
+<p:sld xmlns:a="http://schemas.openxmlformats.org/drawingml/2006/main" xmlns:r="http://schemas.openxmlformats.org/officeDocument/2006/relationships" xmlns:p="http://schemas.openxmlformats.org/presentationml/2006/main">
+  <p:cSld>
+    <p:spTree>
+      <p:nvGrpSpPr>
+        <p:cNvPr id="1" name=""/>
+        <p:cNvGrpSpPr/>
+        <p:nvPr/>
+      </p:nvGrpSpPr>
+      <p:grpSpPr>
+        <a:xfrm>
+          <a:off x="0" y="0"/>
+          <a:ext cx="0" cy="0"/>
+          <a:chOff x="0" y="0"/>
+          <a:chExt cx="0" cy="0"/>
+        </a:xfrm>
+      </p:grpSpPr>
+      <p:pic>
+        <p:nvPicPr>
+          <p:cNvPr id="3" name="Picture 2" descr="A white text on a black background&#10;&#10;Description automatically generated">
+            <a:extLst>
+              <a:ext uri="{FF2B5EF4-FFF2-40B4-BE49-F238E27FC236}">
+                <a16:creationId xmlns:a16="http://schemas.microsoft.com/office/drawing/2014/main" id="{9A619CD1-5541-675F-90FF-F44A8018AA03}"/>
+              </a:ext>
+            </a:extLst>
+          </p:cNvPr>
+          <p:cNvPicPr>
+            <a:picLocks noChangeAspect="1"/>
+          </p:cNvPicPr>
+          <p:nvPr/>
+        </p:nvPicPr>
+        <p:blipFill>
+          <a:blip r:embed="rId2"/>
+          <a:stretch>
+            <a:fillRect/>
+          </a:stretch>
+        </p:blipFill>
+        <p:spPr>
+          <a:xfrm>
+            <a:off x="2692347" y="1519482"/>
+            <a:ext cx="6807306" cy="3819035"/>
+          </a:xfrm>
+          <a:prstGeom prst="rect">
+            <a:avLst/>
+          </a:prstGeom>
+        </p:spPr>
+      </p:pic>
+    </p:spTree>
+    <p:extLst>
+      <p:ext uri="{BB962C8B-B14F-4D97-AF65-F5344CB8AC3E}">
+        <p14:creationId xmlns:p14="http://schemas.microsoft.com/office/powerpoint/2010/main" val="3684479681"/>
+      </p:ext>
+    </p:extLst>
+  </p:cSld>
+  <p:clrMapOvr>
+    <a:masterClrMapping/>
+  </p:clrMapOvr>
+</p:sld>
+</file>
+
+<file path=ppt/slides/slide27.xml><?xml version="1.0" encoding="utf-8"?>
+<p:sld xmlns:a="http://schemas.openxmlformats.org/drawingml/2006/main" xmlns:r="http://schemas.openxmlformats.org/officeDocument/2006/relationships" xmlns:p="http://schemas.openxmlformats.org/presentationml/2006/main">
+  <p:cSld>
+    <p:spTree>
+      <p:nvGrpSpPr>
+        <p:cNvPr id="1" name=""/>
+        <p:cNvGrpSpPr/>
+        <p:nvPr/>
+      </p:nvGrpSpPr>
+      <p:grpSpPr>
+        <a:xfrm>
+          <a:off x="0" y="0"/>
+          <a:ext cx="0" cy="0"/>
+          <a:chOff x="0" y="0"/>
+          <a:chExt cx="0" cy="0"/>
+        </a:xfrm>
+      </p:grpSpPr>
+      <p:pic>
+        <p:nvPicPr>
+          <p:cNvPr id="3" name="Picture 2" descr="A road with words painted on it&#10;&#10;Description automatically generated">
+            <a:extLst>
+              <a:ext uri="{FF2B5EF4-FFF2-40B4-BE49-F238E27FC236}">
+                <a16:creationId xmlns:a16="http://schemas.microsoft.com/office/drawing/2014/main" id="{8C9C7491-7D9F-51E8-D497-53944CC10B69}"/>
+              </a:ext>
+            </a:extLst>
+          </p:cNvPr>
+          <p:cNvPicPr>
+            <a:picLocks noChangeAspect="1"/>
+          </p:cNvPicPr>
+          <p:nvPr/>
+        </p:nvPicPr>
+        <p:blipFill>
+          <a:blip r:embed="rId2"/>
+          <a:stretch>
+            <a:fillRect/>
+          </a:stretch>
+        </p:blipFill>
+        <p:spPr>
+          <a:xfrm>
+            <a:off x="2997086" y="1640429"/>
+            <a:ext cx="6197828" cy="3577141"/>
+          </a:xfrm>
+          <a:prstGeom prst="rect">
+            <a:avLst/>
+          </a:prstGeom>
+        </p:spPr>
+      </p:pic>
+    </p:spTree>
+    <p:extLst>
+      <p:ext uri="{BB962C8B-B14F-4D97-AF65-F5344CB8AC3E}">
+        <p14:creationId xmlns:p14="http://schemas.microsoft.com/office/powerpoint/2010/main" val="2122774986"/>
+      </p:ext>
+    </p:extLst>
+  </p:cSld>
+  <p:clrMapOvr>
+    <a:masterClrMapping/>
+  </p:clrMapOvr>
+</p:sld>
+</file>
+
+<file path=ppt/slides/slide28.xml><?xml version="1.0" encoding="utf-8"?>
+<p:sld xmlns:a="http://schemas.openxmlformats.org/drawingml/2006/main" xmlns:r="http://schemas.openxmlformats.org/officeDocument/2006/relationships" xmlns:p="http://schemas.openxmlformats.org/presentationml/2006/main">
+  <p:cSld>
+    <p:spTree>
+      <p:nvGrpSpPr>
+        <p:cNvPr id="1" name=""/>
+        <p:cNvGrpSpPr/>
+        <p:nvPr/>
+      </p:nvGrpSpPr>
+      <p:grpSpPr>
+        <a:xfrm>
+          <a:off x="0" y="0"/>
+          <a:ext cx="0" cy="0"/>
+          <a:chOff x="0" y="0"/>
+          <a:chExt cx="0" cy="0"/>
+        </a:xfrm>
+      </p:grpSpPr>
+      <p:pic>
+        <p:nvPicPr>
+          <p:cNvPr id="3" name="Picture 2" descr="Close-up of a typewriter and a piece of paper&#10;&#10;Description automatically generated">
+            <a:extLst>
+              <a:ext uri="{FF2B5EF4-FFF2-40B4-BE49-F238E27FC236}">
+                <a16:creationId xmlns:a16="http://schemas.microsoft.com/office/drawing/2014/main" id="{AEB63C77-0BCB-546D-0C35-56630B66BE57}"/>
+              </a:ext>
+            </a:extLst>
+          </p:cNvPr>
+          <p:cNvPicPr>
+            <a:picLocks noChangeAspect="1"/>
+          </p:cNvPicPr>
+          <p:nvPr/>
+        </p:nvPicPr>
+        <p:blipFill>
+          <a:blip r:embed="rId2"/>
+          <a:stretch>
+            <a:fillRect/>
+          </a:stretch>
+        </p:blipFill>
+        <p:spPr>
+          <a:xfrm>
+            <a:off x="3378405" y="1566379"/>
+            <a:ext cx="5435189" cy="3725242"/>
+          </a:xfrm>
+          <a:prstGeom prst="rect">
+            <a:avLst/>
+          </a:prstGeom>
+        </p:spPr>
+      </p:pic>
+    </p:spTree>
+    <p:extLst>
+      <p:ext uri="{BB962C8B-B14F-4D97-AF65-F5344CB8AC3E}">
+        <p14:creationId xmlns:p14="http://schemas.microsoft.com/office/powerpoint/2010/main" val="3349122556"/>
       </p:ext>
     </p:extLst>
   </p:cSld>
@@ -4959,6 +6972,20 @@
             </a:r>
           </a:p>
           <a:p>
+            <a:pPr lvl="1"/>
+            <a:r>
+              <a:rPr lang="en-US" dirty="0"/>
+              <a:t>Leadership</a:t>
+            </a:r>
+          </a:p>
+          <a:p>
+            <a:pPr lvl="1"/>
+            <a:r>
+              <a:rPr lang="en-US" dirty="0"/>
+              <a:t>more?</a:t>
+            </a:r>
+          </a:p>
+          <a:p>
             <a:r>
               <a:rPr lang="en-US" dirty="0"/>
               <a:t>Effect of experience</a:t>
@@ -4999,6 +7026,577 @@
     <p:extLst>
       <p:ext uri="{BB962C8B-B14F-4D97-AF65-F5344CB8AC3E}">
         <p14:creationId xmlns:p14="http://schemas.microsoft.com/office/powerpoint/2010/main" val="1617660472"/>
+      </p:ext>
+    </p:extLst>
+  </p:cSld>
+  <p:clrMapOvr>
+    <a:masterClrMapping/>
+  </p:clrMapOvr>
+</p:sld>
+</file>
+
+<file path=ppt/slides/slide5.xml><?xml version="1.0" encoding="utf-8"?>
+<p:sld xmlns:a="http://schemas.openxmlformats.org/drawingml/2006/main" xmlns:r="http://schemas.openxmlformats.org/officeDocument/2006/relationships" xmlns:p="http://schemas.openxmlformats.org/presentationml/2006/main">
+  <p:cSld>
+    <p:spTree>
+      <p:nvGrpSpPr>
+        <p:cNvPr id="1" name=""/>
+        <p:cNvGrpSpPr/>
+        <p:nvPr/>
+      </p:nvGrpSpPr>
+      <p:grpSpPr>
+        <a:xfrm>
+          <a:off x="0" y="0"/>
+          <a:ext cx="0" cy="0"/>
+          <a:chOff x="0" y="0"/>
+          <a:chExt cx="0" cy="0"/>
+        </a:xfrm>
+      </p:grpSpPr>
+      <p:sp>
+        <p:nvSpPr>
+          <p:cNvPr id="2" name="Title 1">
+            <a:extLst>
+              <a:ext uri="{FF2B5EF4-FFF2-40B4-BE49-F238E27FC236}">
+                <a16:creationId xmlns:a16="http://schemas.microsoft.com/office/drawing/2014/main" id="{A1AAE40B-FFD2-11F4-B7DF-1FD576DD4AF7}"/>
+              </a:ext>
+            </a:extLst>
+          </p:cNvPr>
+          <p:cNvSpPr>
+            <a:spLocks noGrp="1"/>
+          </p:cNvSpPr>
+          <p:nvPr>
+            <p:ph type="title"/>
+          </p:nvPr>
+        </p:nvSpPr>
+        <p:spPr/>
+        <p:txBody>
+          <a:bodyPr/>
+          <a:lstStyle/>
+          <a:p>
+            <a:r>
+              <a:rPr lang="en-US" b="0" dirty="0" err="1">
+                <a:solidFill>
+                  <a:srgbClr val="9CDCFE"/>
+                </a:solidFill>
+                <a:effectLst/>
+                <a:latin typeface="Consolas" panose="020B0609020204030204" pitchFamily="49" charset="0"/>
+              </a:rPr>
+              <a:t>nfl_data</a:t>
+            </a:r>
+            <a:r>
+              <a:rPr lang="en-US" b="0" dirty="0" err="1">
+                <a:solidFill>
+                  <a:srgbClr val="CCCCCC"/>
+                </a:solidFill>
+                <a:effectLst/>
+                <a:latin typeface="Consolas" panose="020B0609020204030204" pitchFamily="49" charset="0"/>
+              </a:rPr>
+              <a:t>.</a:t>
+            </a:r>
+            <a:r>
+              <a:rPr lang="en-US" b="0" dirty="0" err="1">
+                <a:solidFill>
+                  <a:srgbClr val="DCDCAA"/>
+                </a:solidFill>
+                <a:effectLst/>
+                <a:latin typeface="Consolas" panose="020B0609020204030204" pitchFamily="49" charset="0"/>
+              </a:rPr>
+              <a:t>head</a:t>
+            </a:r>
+            <a:r>
+              <a:rPr lang="en-US" b="0" dirty="0">
+                <a:solidFill>
+                  <a:srgbClr val="CCCCCC"/>
+                </a:solidFill>
+                <a:effectLst/>
+                <a:latin typeface="Consolas" panose="020B0609020204030204" pitchFamily="49" charset="0"/>
+              </a:rPr>
+              <a:t>()</a:t>
+            </a:r>
+            <a:endParaRPr lang="en-US" dirty="0"/>
+          </a:p>
+        </p:txBody>
+      </p:sp>
+      <p:pic>
+        <p:nvPicPr>
+          <p:cNvPr id="4" name="Picture 3">
+            <a:extLst>
+              <a:ext uri="{FF2B5EF4-FFF2-40B4-BE49-F238E27FC236}">
+                <a16:creationId xmlns:a16="http://schemas.microsoft.com/office/drawing/2014/main" id="{713170AA-B9D4-9A9B-96A2-42841069498E}"/>
+              </a:ext>
+            </a:extLst>
+          </p:cNvPr>
+          <p:cNvPicPr>
+            <a:picLocks noChangeAspect="1"/>
+          </p:cNvPicPr>
+          <p:nvPr/>
+        </p:nvPicPr>
+        <p:blipFill>
+          <a:blip r:embed="rId2"/>
+          <a:stretch>
+            <a:fillRect/>
+          </a:stretch>
+        </p:blipFill>
+        <p:spPr>
+          <a:xfrm>
+            <a:off x="2592359" y="2200017"/>
+            <a:ext cx="7007282" cy="3928325"/>
+          </a:xfrm>
+          <a:prstGeom prst="rect">
+            <a:avLst/>
+          </a:prstGeom>
+        </p:spPr>
+      </p:pic>
+    </p:spTree>
+    <p:extLst>
+      <p:ext uri="{BB962C8B-B14F-4D97-AF65-F5344CB8AC3E}">
+        <p14:creationId xmlns:p14="http://schemas.microsoft.com/office/powerpoint/2010/main" val="194452625"/>
+      </p:ext>
+    </p:extLst>
+  </p:cSld>
+  <p:clrMapOvr>
+    <a:masterClrMapping/>
+  </p:clrMapOvr>
+</p:sld>
+</file>
+
+<file path=ppt/slides/slide6.xml><?xml version="1.0" encoding="utf-8"?>
+<p:sld xmlns:a="http://schemas.openxmlformats.org/drawingml/2006/main" xmlns:r="http://schemas.openxmlformats.org/officeDocument/2006/relationships" xmlns:p="http://schemas.openxmlformats.org/presentationml/2006/main">
+  <p:cSld>
+    <p:spTree>
+      <p:nvGrpSpPr>
+        <p:cNvPr id="1" name=""/>
+        <p:cNvGrpSpPr/>
+        <p:nvPr/>
+      </p:nvGrpSpPr>
+      <p:grpSpPr>
+        <a:xfrm>
+          <a:off x="0" y="0"/>
+          <a:ext cx="0" cy="0"/>
+          <a:chOff x="0" y="0"/>
+          <a:chExt cx="0" cy="0"/>
+        </a:xfrm>
+      </p:grpSpPr>
+      <p:sp>
+        <p:nvSpPr>
+          <p:cNvPr id="2" name="Title 1">
+            <a:extLst>
+              <a:ext uri="{FF2B5EF4-FFF2-40B4-BE49-F238E27FC236}">
+                <a16:creationId xmlns:a16="http://schemas.microsoft.com/office/drawing/2014/main" id="{A1AAE40B-FFD2-11F4-B7DF-1FD576DD4AF7}"/>
+              </a:ext>
+            </a:extLst>
+          </p:cNvPr>
+          <p:cNvSpPr>
+            <a:spLocks noGrp="1"/>
+          </p:cNvSpPr>
+          <p:nvPr>
+            <p:ph type="title"/>
+          </p:nvPr>
+        </p:nvSpPr>
+        <p:spPr/>
+        <p:txBody>
+          <a:bodyPr/>
+          <a:lstStyle/>
+          <a:p>
+            <a:r>
+              <a:rPr lang="en-US" b="0" dirty="0">
+                <a:effectLst/>
+                <a:latin typeface="Consolas" panose="020B0609020204030204" pitchFamily="49" charset="0"/>
+              </a:rPr>
+              <a:t>Standard Scaler</a:t>
+            </a:r>
+            <a:endParaRPr lang="en-US" dirty="0"/>
+          </a:p>
+        </p:txBody>
+      </p:sp>
+      <p:pic>
+        <p:nvPicPr>
+          <p:cNvPr id="4" name="Picture 3" descr="A screen shot of a computer code&#10;&#10;Description automatically generated">
+            <a:extLst>
+              <a:ext uri="{FF2B5EF4-FFF2-40B4-BE49-F238E27FC236}">
+                <a16:creationId xmlns:a16="http://schemas.microsoft.com/office/drawing/2014/main" id="{F6BCD9DF-8863-084B-2A0B-1158EE02AC49}"/>
+              </a:ext>
+            </a:extLst>
+          </p:cNvPr>
+          <p:cNvPicPr>
+            <a:picLocks noChangeAspect="1"/>
+          </p:cNvPicPr>
+          <p:nvPr/>
+        </p:nvPicPr>
+        <p:blipFill>
+          <a:blip r:embed="rId2"/>
+          <a:stretch>
+            <a:fillRect/>
+          </a:stretch>
+        </p:blipFill>
+        <p:spPr>
+          <a:xfrm>
+            <a:off x="771654" y="2528150"/>
+            <a:ext cx="6971428" cy="2961905"/>
+          </a:xfrm>
+          <a:prstGeom prst="rect">
+            <a:avLst/>
+          </a:prstGeom>
+        </p:spPr>
+      </p:pic>
+      <p:pic>
+        <p:nvPicPr>
+          <p:cNvPr id="6" name="Picture 5" descr="A screenshot of a computer&#10;&#10;Description automatically generated">
+            <a:extLst>
+              <a:ext uri="{FF2B5EF4-FFF2-40B4-BE49-F238E27FC236}">
+                <a16:creationId xmlns:a16="http://schemas.microsoft.com/office/drawing/2014/main" id="{4C4550F2-495B-2A5B-D907-361C0EFC500B}"/>
+              </a:ext>
+            </a:extLst>
+          </p:cNvPr>
+          <p:cNvPicPr>
+            <a:picLocks noChangeAspect="1"/>
+          </p:cNvPicPr>
+          <p:nvPr/>
+        </p:nvPicPr>
+        <p:blipFill>
+          <a:blip r:embed="rId3"/>
+          <a:stretch>
+            <a:fillRect/>
+          </a:stretch>
+        </p:blipFill>
+        <p:spPr>
+          <a:xfrm>
+            <a:off x="8633588" y="2334687"/>
+            <a:ext cx="2432797" cy="3479636"/>
+          </a:xfrm>
+          <a:prstGeom prst="rect">
+            <a:avLst/>
+          </a:prstGeom>
+        </p:spPr>
+      </p:pic>
+    </p:spTree>
+    <p:extLst>
+      <p:ext uri="{BB962C8B-B14F-4D97-AF65-F5344CB8AC3E}">
+        <p14:creationId xmlns:p14="http://schemas.microsoft.com/office/powerpoint/2010/main" val="2795829180"/>
+      </p:ext>
+    </p:extLst>
+  </p:cSld>
+  <p:clrMapOvr>
+    <a:masterClrMapping/>
+  </p:clrMapOvr>
+</p:sld>
+</file>
+
+<file path=ppt/slides/slide7.xml><?xml version="1.0" encoding="utf-8"?>
+<p:sld xmlns:a="http://schemas.openxmlformats.org/drawingml/2006/main" xmlns:r="http://schemas.openxmlformats.org/officeDocument/2006/relationships" xmlns:p="http://schemas.openxmlformats.org/presentationml/2006/main">
+  <p:cSld>
+    <p:spTree>
+      <p:nvGrpSpPr>
+        <p:cNvPr id="1" name=""/>
+        <p:cNvGrpSpPr/>
+        <p:nvPr/>
+      </p:nvGrpSpPr>
+      <p:grpSpPr>
+        <a:xfrm>
+          <a:off x="0" y="0"/>
+          <a:ext cx="0" cy="0"/>
+          <a:chOff x="0" y="0"/>
+          <a:chExt cx="0" cy="0"/>
+        </a:xfrm>
+      </p:grpSpPr>
+      <p:sp>
+        <p:nvSpPr>
+          <p:cNvPr id="2" name="Title 1">
+            <a:extLst>
+              <a:ext uri="{FF2B5EF4-FFF2-40B4-BE49-F238E27FC236}">
+                <a16:creationId xmlns:a16="http://schemas.microsoft.com/office/drawing/2014/main" id="{A1AAE40B-FFD2-11F4-B7DF-1FD576DD4AF7}"/>
+              </a:ext>
+            </a:extLst>
+          </p:cNvPr>
+          <p:cNvSpPr>
+            <a:spLocks noGrp="1"/>
+          </p:cNvSpPr>
+          <p:nvPr>
+            <p:ph type="title"/>
+          </p:nvPr>
+        </p:nvSpPr>
+        <p:spPr/>
+        <p:txBody>
+          <a:bodyPr/>
+          <a:lstStyle/>
+          <a:p>
+            <a:r>
+              <a:rPr lang="en-US" dirty="0"/>
+              <a:t>Random forest regressor</a:t>
+            </a:r>
+          </a:p>
+        </p:txBody>
+      </p:sp>
+      <p:pic>
+        <p:nvPicPr>
+          <p:cNvPr id="5" name="Picture 4" descr="A computer screen shot of text&#10;&#10;Description automatically generated">
+            <a:extLst>
+              <a:ext uri="{FF2B5EF4-FFF2-40B4-BE49-F238E27FC236}">
+                <a16:creationId xmlns:a16="http://schemas.microsoft.com/office/drawing/2014/main" id="{3809B15A-EB0A-9477-C0CF-1D6CE6348ECF}"/>
+              </a:ext>
+            </a:extLst>
+          </p:cNvPr>
+          <p:cNvPicPr>
+            <a:picLocks noChangeAspect="1"/>
+          </p:cNvPicPr>
+          <p:nvPr/>
+        </p:nvPicPr>
+        <p:blipFill>
+          <a:blip r:embed="rId2"/>
+          <a:stretch>
+            <a:fillRect/>
+          </a:stretch>
+        </p:blipFill>
+        <p:spPr>
+          <a:xfrm>
+            <a:off x="818575" y="2330330"/>
+            <a:ext cx="4815179" cy="1720561"/>
+          </a:xfrm>
+          <a:prstGeom prst="rect">
+            <a:avLst/>
+          </a:prstGeom>
+        </p:spPr>
+      </p:pic>
+      <p:pic>
+        <p:nvPicPr>
+          <p:cNvPr id="7" name="Picture 6" descr="A screen shot of a computer program&#10;&#10;Description automatically generated">
+            <a:extLst>
+              <a:ext uri="{FF2B5EF4-FFF2-40B4-BE49-F238E27FC236}">
+                <a16:creationId xmlns:a16="http://schemas.microsoft.com/office/drawing/2014/main" id="{81AC6249-8BC4-C34C-4459-BB85474B4A78}"/>
+              </a:ext>
+            </a:extLst>
+          </p:cNvPr>
+          <p:cNvPicPr>
+            <a:picLocks noChangeAspect="1"/>
+          </p:cNvPicPr>
+          <p:nvPr/>
+        </p:nvPicPr>
+        <p:blipFill>
+          <a:blip r:embed="rId3"/>
+          <a:stretch>
+            <a:fillRect/>
+          </a:stretch>
+        </p:blipFill>
+        <p:spPr>
+          <a:xfrm>
+            <a:off x="5889653" y="2631843"/>
+            <a:ext cx="5555095" cy="3455988"/>
+          </a:xfrm>
+          <a:prstGeom prst="rect">
+            <a:avLst/>
+          </a:prstGeom>
+        </p:spPr>
+      </p:pic>
+      <p:pic>
+        <p:nvPicPr>
+          <p:cNvPr id="9" name="Picture 8" descr="A screen shot of a computer error&#10;&#10;Description automatically generated">
+            <a:extLst>
+              <a:ext uri="{FF2B5EF4-FFF2-40B4-BE49-F238E27FC236}">
+                <a16:creationId xmlns:a16="http://schemas.microsoft.com/office/drawing/2014/main" id="{EA0C647E-CAFE-C636-E953-F395FC4C0A78}"/>
+              </a:ext>
+            </a:extLst>
+          </p:cNvPr>
+          <p:cNvPicPr>
+            <a:picLocks noChangeAspect="1"/>
+          </p:cNvPicPr>
+          <p:nvPr/>
+        </p:nvPicPr>
+        <p:blipFill>
+          <a:blip r:embed="rId4"/>
+          <a:stretch>
+            <a:fillRect/>
+          </a:stretch>
+        </p:blipFill>
+        <p:spPr>
+          <a:xfrm>
+            <a:off x="575894" y="4279730"/>
+            <a:ext cx="4451016" cy="1720561"/>
+          </a:xfrm>
+          <a:prstGeom prst="rect">
+            <a:avLst/>
+          </a:prstGeom>
+        </p:spPr>
+      </p:pic>
+    </p:spTree>
+    <p:extLst>
+      <p:ext uri="{BB962C8B-B14F-4D97-AF65-F5344CB8AC3E}">
+        <p14:creationId xmlns:p14="http://schemas.microsoft.com/office/powerpoint/2010/main" val="3255403528"/>
+      </p:ext>
+    </p:extLst>
+  </p:cSld>
+  <p:clrMapOvr>
+    <a:masterClrMapping/>
+  </p:clrMapOvr>
+</p:sld>
+</file>
+
+<file path=ppt/slides/slide8.xml><?xml version="1.0" encoding="utf-8"?>
+<p:sld xmlns:a="http://schemas.openxmlformats.org/drawingml/2006/main" xmlns:r="http://schemas.openxmlformats.org/officeDocument/2006/relationships" xmlns:p="http://schemas.openxmlformats.org/presentationml/2006/main">
+  <p:cSld>
+    <p:spTree>
+      <p:nvGrpSpPr>
+        <p:cNvPr id="1" name=""/>
+        <p:cNvGrpSpPr/>
+        <p:nvPr/>
+      </p:nvGrpSpPr>
+      <p:grpSpPr>
+        <a:xfrm>
+          <a:off x="0" y="0"/>
+          <a:ext cx="0" cy="0"/>
+          <a:chOff x="0" y="0"/>
+          <a:chExt cx="0" cy="0"/>
+        </a:xfrm>
+      </p:grpSpPr>
+      <p:sp>
+        <p:nvSpPr>
+          <p:cNvPr id="2" name="Title 1">
+            <a:extLst>
+              <a:ext uri="{FF2B5EF4-FFF2-40B4-BE49-F238E27FC236}">
+                <a16:creationId xmlns:a16="http://schemas.microsoft.com/office/drawing/2014/main" id="{A1AAE40B-FFD2-11F4-B7DF-1FD576DD4AF7}"/>
+              </a:ext>
+            </a:extLst>
+          </p:cNvPr>
+          <p:cNvSpPr>
+            <a:spLocks noGrp="1"/>
+          </p:cNvSpPr>
+          <p:nvPr>
+            <p:ph type="title"/>
+          </p:nvPr>
+        </p:nvSpPr>
+        <p:spPr/>
+        <p:txBody>
+          <a:bodyPr/>
+          <a:lstStyle/>
+          <a:p>
+            <a:r>
+              <a:rPr lang="en-US" dirty="0"/>
+              <a:t>Random forest regressor (cont., hyperparameter tuning)</a:t>
+            </a:r>
+          </a:p>
+        </p:txBody>
+      </p:sp>
+      <p:pic>
+        <p:nvPicPr>
+          <p:cNvPr id="6" name="Picture 5" descr="A computer screen shot of a black screen&#10;&#10;Description automatically generated">
+            <a:extLst>
+              <a:ext uri="{FF2B5EF4-FFF2-40B4-BE49-F238E27FC236}">
+                <a16:creationId xmlns:a16="http://schemas.microsoft.com/office/drawing/2014/main" id="{2ED3BF22-D229-4454-3B18-3E9BF3CBD28C}"/>
+              </a:ext>
+            </a:extLst>
+          </p:cNvPr>
+          <p:cNvPicPr>
+            <a:picLocks noChangeAspect="1"/>
+          </p:cNvPicPr>
+          <p:nvPr/>
+        </p:nvPicPr>
+        <p:blipFill>
+          <a:blip r:embed="rId2"/>
+          <a:stretch>
+            <a:fillRect/>
+          </a:stretch>
+        </p:blipFill>
+        <p:spPr>
+          <a:xfrm>
+            <a:off x="1548490" y="1923215"/>
+            <a:ext cx="9084423" cy="4627914"/>
+          </a:xfrm>
+          <a:prstGeom prst="rect">
+            <a:avLst/>
+          </a:prstGeom>
+        </p:spPr>
+      </p:pic>
+    </p:spTree>
+    <p:extLst>
+      <p:ext uri="{BB962C8B-B14F-4D97-AF65-F5344CB8AC3E}">
+        <p14:creationId xmlns:p14="http://schemas.microsoft.com/office/powerpoint/2010/main" val="1766924509"/>
+      </p:ext>
+    </p:extLst>
+  </p:cSld>
+  <p:clrMapOvr>
+    <a:masterClrMapping/>
+  </p:clrMapOvr>
+</p:sld>
+</file>
+
+<file path=ppt/slides/slide9.xml><?xml version="1.0" encoding="utf-8"?>
+<p:sld xmlns:a="http://schemas.openxmlformats.org/drawingml/2006/main" xmlns:r="http://schemas.openxmlformats.org/officeDocument/2006/relationships" xmlns:p="http://schemas.openxmlformats.org/presentationml/2006/main">
+  <p:cSld>
+    <p:spTree>
+      <p:nvGrpSpPr>
+        <p:cNvPr id="1" name=""/>
+        <p:cNvGrpSpPr/>
+        <p:nvPr/>
+      </p:nvGrpSpPr>
+      <p:grpSpPr>
+        <a:xfrm>
+          <a:off x="0" y="0"/>
+          <a:ext cx="0" cy="0"/>
+          <a:chOff x="0" y="0"/>
+          <a:chExt cx="0" cy="0"/>
+        </a:xfrm>
+      </p:grpSpPr>
+      <p:sp>
+        <p:nvSpPr>
+          <p:cNvPr id="2" name="Title 1">
+            <a:extLst>
+              <a:ext uri="{FF2B5EF4-FFF2-40B4-BE49-F238E27FC236}">
+                <a16:creationId xmlns:a16="http://schemas.microsoft.com/office/drawing/2014/main" id="{A1AAE40B-FFD2-11F4-B7DF-1FD576DD4AF7}"/>
+              </a:ext>
+            </a:extLst>
+          </p:cNvPr>
+          <p:cNvSpPr>
+            <a:spLocks noGrp="1"/>
+          </p:cNvSpPr>
+          <p:nvPr>
+            <p:ph type="title"/>
+          </p:nvPr>
+        </p:nvSpPr>
+        <p:spPr/>
+        <p:txBody>
+          <a:bodyPr/>
+          <a:lstStyle/>
+          <a:p>
+            <a:r>
+              <a:rPr lang="en-US" dirty="0"/>
+              <a:t>Random forest regressor (cont., hyperparameter tuning)</a:t>
+            </a:r>
+          </a:p>
+        </p:txBody>
+      </p:sp>
+      <p:pic>
+        <p:nvPicPr>
+          <p:cNvPr id="4" name="Picture 3" descr="A screen shot of a computer program&#10;&#10;Description automatically generated">
+            <a:extLst>
+              <a:ext uri="{FF2B5EF4-FFF2-40B4-BE49-F238E27FC236}">
+                <a16:creationId xmlns:a16="http://schemas.microsoft.com/office/drawing/2014/main" id="{B87A69A6-5CA6-132B-996D-7F8DF8905CCA}"/>
+              </a:ext>
+            </a:extLst>
+          </p:cNvPr>
+          <p:cNvPicPr>
+            <a:picLocks noChangeAspect="1"/>
+          </p:cNvPicPr>
+          <p:nvPr/>
+        </p:nvPicPr>
+        <p:blipFill>
+          <a:blip r:embed="rId2"/>
+          <a:stretch>
+            <a:fillRect/>
+          </a:stretch>
+        </p:blipFill>
+        <p:spPr>
+          <a:xfrm>
+            <a:off x="2090081" y="2008619"/>
+            <a:ext cx="8011838" cy="4549496"/>
+          </a:xfrm>
+          <a:prstGeom prst="rect">
+            <a:avLst/>
+          </a:prstGeom>
+        </p:spPr>
+      </p:pic>
+    </p:spTree>
+    <p:extLst>
+      <p:ext uri="{BB962C8B-B14F-4D97-AF65-F5344CB8AC3E}">
+        <p14:creationId xmlns:p14="http://schemas.microsoft.com/office/powerpoint/2010/main" val="225030360"/>
       </p:ext>
     </p:extLst>
   </p:cSld>

</xml_diff>